<commit_message>
edits done to poster
</commit_message>
<xml_diff>
--- a/Posters/Poster-RicardoMartinez.pptx
+++ b/Posters/Poster-RicardoMartinez.pptx
@@ -233,7 +233,7 @@
             <a:fld id="{AC579C2D-29BE-6948-80B9-138A16B9DF50}" type="datetime1">
               <a:rPr lang="en-US"/>
               <a:pPr/>
-              <a:t>12/3/14</a:t>
+              <a:t>12/4/14</a:t>
             </a:fld>
             <a:endParaRPr lang="en-US"/>
           </a:p>
@@ -4597,7 +4597,7 @@
         <p:spPr bwMode="auto">
           <a:xfrm>
             <a:off x="1219200" y="42138600"/>
-            <a:ext cx="30632400" cy="1084502"/>
+            <a:ext cx="30632400" cy="1022947"/>
           </a:xfrm>
           <a:prstGeom prst="rect">
             <a:avLst/>
@@ -4741,30 +4741,30 @@
           <a:p>
             <a:pPr algn="ctr"/>
             <a:r>
-              <a:rPr lang="en-US" sz="3200" dirty="0"/>
+              <a:rPr lang="en-US" sz="3000" dirty="0"/>
               <a:t>The material presented in this poster is based upon the work supported by Gabriela Wilson and </a:t>
             </a:r>
             <a:r>
-              <a:rPr lang="en-US" sz="3200" dirty="0" smtClean="0"/>
+              <a:rPr lang="en-US" sz="3000" dirty="0" smtClean="0"/>
               <a:t>the Village of Pinecrest. </a:t>
             </a:r>
             <a:r>
-              <a:rPr lang="en-US" sz="3200" dirty="0"/>
+              <a:rPr lang="en-US" sz="3000" dirty="0"/>
               <a:t>I am thankful </a:t>
             </a:r>
             <a:r>
-              <a:rPr lang="en-US" sz="3200" dirty="0" smtClean="0"/>
+              <a:rPr lang="en-US" sz="3000" dirty="0" smtClean="0"/>
               <a:t>for </a:t>
             </a:r>
             <a:r>
-              <a:rPr lang="en-US" sz="3200" dirty="0"/>
+              <a:rPr lang="en-US" sz="3000" dirty="0"/>
               <a:t>the help that I received from my </a:t>
             </a:r>
             <a:r>
-              <a:rPr lang="en-US" sz="3200" dirty="0" smtClean="0"/>
+              <a:rPr lang="en-US" sz="3000" dirty="0" smtClean="0"/>
               <a:t>teammate Maurice Pruna</a:t>
             </a:r>
-            <a:endParaRPr lang="en-US" sz="3200" dirty="0">
+            <a:endParaRPr lang="en-US" sz="3000" dirty="0">
               <a:effectLst/>
             </a:endParaRPr>
           </a:p>
@@ -5137,350 +5137,6 @@
       </p:pic>
       <p:sp>
         <p:nvSpPr>
-          <p:cNvPr id="34" name="Text Box 19"/>
-          <p:cNvSpPr txBox="1">
-            <a:spLocks noChangeArrowheads="1"/>
-          </p:cNvSpPr>
-          <p:nvPr/>
-        </p:nvSpPr>
-        <p:spPr bwMode="auto">
-          <a:xfrm>
-            <a:off x="13639800" y="5973763"/>
-            <a:ext cx="5486400" cy="731837"/>
-          </a:xfrm>
-          <a:prstGeom prst="rect">
-            <a:avLst/>
-          </a:prstGeom>
-          <a:solidFill>
-            <a:srgbClr val="B6A674"/>
-          </a:solidFill>
-          <a:ln>
-            <a:headEnd/>
-            <a:tailEnd/>
-          </a:ln>
-        </p:spPr>
-        <p:style>
-          <a:lnRef idx="1">
-            <a:schemeClr val="dk1"/>
-          </a:lnRef>
-          <a:fillRef idx="2">
-            <a:schemeClr val="dk1"/>
-          </a:fillRef>
-          <a:effectRef idx="1">
-            <a:schemeClr val="dk1"/>
-          </a:effectRef>
-          <a:fontRef idx="minor">
-            <a:schemeClr val="dk1"/>
-          </a:fontRef>
-        </p:style>
-        <p:txBody>
-          <a:bodyPr lIns="98655" tIns="49327" rIns="98655" bIns="49327">
-            <a:spAutoFit/>
-          </a:bodyPr>
-          <a:lstStyle>
-            <a:lvl1pPr defTabSz="985838" eaLnBrk="0" hangingPunct="0">
-              <a:defRPr sz="8400">
-                <a:solidFill>
-                  <a:schemeClr val="tx1"/>
-                </a:solidFill>
-                <a:latin typeface="Arial" charset="0"/>
-                <a:ea typeface="ＭＳ Ｐゴシック" charset="0"/>
-                <a:cs typeface="ＭＳ Ｐゴシック" charset="0"/>
-              </a:defRPr>
-            </a:lvl1pPr>
-            <a:lvl2pPr marL="37931725" indent="-37474525" defTabSz="985838" eaLnBrk="0" hangingPunct="0">
-              <a:defRPr sz="8400">
-                <a:solidFill>
-                  <a:schemeClr val="tx1"/>
-                </a:solidFill>
-                <a:latin typeface="Arial" charset="0"/>
-                <a:ea typeface="ＭＳ Ｐゴシック" charset="0"/>
-              </a:defRPr>
-            </a:lvl2pPr>
-            <a:lvl3pPr eaLnBrk="0" hangingPunct="0">
-              <a:defRPr sz="8400">
-                <a:solidFill>
-                  <a:schemeClr val="tx1"/>
-                </a:solidFill>
-                <a:latin typeface="Arial" charset="0"/>
-                <a:ea typeface="ＭＳ Ｐゴシック" charset="0"/>
-              </a:defRPr>
-            </a:lvl3pPr>
-            <a:lvl4pPr eaLnBrk="0" hangingPunct="0">
-              <a:defRPr sz="8400">
-                <a:solidFill>
-                  <a:schemeClr val="tx1"/>
-                </a:solidFill>
-                <a:latin typeface="Arial" charset="0"/>
-                <a:ea typeface="ＭＳ Ｐゴシック" charset="0"/>
-              </a:defRPr>
-            </a:lvl4pPr>
-            <a:lvl5pPr eaLnBrk="0" hangingPunct="0">
-              <a:defRPr sz="8400">
-                <a:solidFill>
-                  <a:schemeClr val="tx1"/>
-                </a:solidFill>
-                <a:latin typeface="Arial" charset="0"/>
-                <a:ea typeface="ＭＳ Ｐゴシック" charset="0"/>
-              </a:defRPr>
-            </a:lvl5pPr>
-            <a:lvl6pPr marL="457200" eaLnBrk="0" fontAlgn="base" hangingPunct="0">
-              <a:spcBef>
-                <a:spcPct val="0"/>
-              </a:spcBef>
-              <a:spcAft>
-                <a:spcPct val="0"/>
-              </a:spcAft>
-              <a:defRPr sz="8400">
-                <a:solidFill>
-                  <a:schemeClr val="tx1"/>
-                </a:solidFill>
-                <a:latin typeface="Arial" charset="0"/>
-                <a:ea typeface="ＭＳ Ｐゴシック" charset="0"/>
-              </a:defRPr>
-            </a:lvl6pPr>
-            <a:lvl7pPr marL="914400" eaLnBrk="0" fontAlgn="base" hangingPunct="0">
-              <a:spcBef>
-                <a:spcPct val="0"/>
-              </a:spcBef>
-              <a:spcAft>
-                <a:spcPct val="0"/>
-              </a:spcAft>
-              <a:defRPr sz="8400">
-                <a:solidFill>
-                  <a:schemeClr val="tx1"/>
-                </a:solidFill>
-                <a:latin typeface="Arial" charset="0"/>
-                <a:ea typeface="ＭＳ Ｐゴシック" charset="0"/>
-              </a:defRPr>
-            </a:lvl7pPr>
-            <a:lvl8pPr marL="1371600" eaLnBrk="0" fontAlgn="base" hangingPunct="0">
-              <a:spcBef>
-                <a:spcPct val="0"/>
-              </a:spcBef>
-              <a:spcAft>
-                <a:spcPct val="0"/>
-              </a:spcAft>
-              <a:defRPr sz="8400">
-                <a:solidFill>
-                  <a:schemeClr val="tx1"/>
-                </a:solidFill>
-                <a:latin typeface="Arial" charset="0"/>
-                <a:ea typeface="ＭＳ Ｐゴシック" charset="0"/>
-              </a:defRPr>
-            </a:lvl8pPr>
-            <a:lvl9pPr marL="1828800" eaLnBrk="0" fontAlgn="base" hangingPunct="0">
-              <a:spcBef>
-                <a:spcPct val="0"/>
-              </a:spcBef>
-              <a:spcAft>
-                <a:spcPct val="0"/>
-              </a:spcAft>
-              <a:defRPr sz="8400">
-                <a:solidFill>
-                  <a:schemeClr val="tx1"/>
-                </a:solidFill>
-                <a:latin typeface="Arial" charset="0"/>
-                <a:ea typeface="ＭＳ Ｐゴシック" charset="0"/>
-              </a:defRPr>
-            </a:lvl9pPr>
-          </a:lstStyle>
-          <a:p>
-            <a:pPr algn="ctr" eaLnBrk="1" hangingPunct="1">
-              <a:spcBef>
-                <a:spcPct val="50000"/>
-              </a:spcBef>
-            </a:pPr>
-            <a:r>
-              <a:rPr lang="en-US" sz="4100" b="1" dirty="0">
-                <a:solidFill>
-                  <a:srgbClr val="1B390A"/>
-                </a:solidFill>
-                <a:effectLst>
-                  <a:outerShdw blurRad="38100" dist="38100" dir="2700000" algn="tl">
-                    <a:srgbClr val="DDDDDD"/>
-                  </a:outerShdw>
-                </a:effectLst>
-              </a:rPr>
-              <a:t>Current System</a:t>
-            </a:r>
-          </a:p>
-        </p:txBody>
-      </p:sp>
-      <p:sp>
-        <p:nvSpPr>
-          <p:cNvPr id="35" name="Text Box 19"/>
-          <p:cNvSpPr txBox="1">
-            <a:spLocks noChangeArrowheads="1"/>
-          </p:cNvSpPr>
-          <p:nvPr/>
-        </p:nvSpPr>
-        <p:spPr bwMode="auto">
-          <a:xfrm>
-            <a:off x="23393400" y="5973763"/>
-            <a:ext cx="5486400" cy="731837"/>
-          </a:xfrm>
-          <a:prstGeom prst="rect">
-            <a:avLst/>
-          </a:prstGeom>
-          <a:solidFill>
-            <a:srgbClr val="B6A674"/>
-          </a:solidFill>
-          <a:ln>
-            <a:headEnd/>
-            <a:tailEnd/>
-          </a:ln>
-        </p:spPr>
-        <p:style>
-          <a:lnRef idx="1">
-            <a:schemeClr val="dk1"/>
-          </a:lnRef>
-          <a:fillRef idx="2">
-            <a:schemeClr val="dk1"/>
-          </a:fillRef>
-          <a:effectRef idx="1">
-            <a:schemeClr val="dk1"/>
-          </a:effectRef>
-          <a:fontRef idx="minor">
-            <a:schemeClr val="dk1"/>
-          </a:fontRef>
-        </p:style>
-        <p:txBody>
-          <a:bodyPr lIns="98655" tIns="49327" rIns="98655" bIns="49327">
-            <a:spAutoFit/>
-          </a:bodyPr>
-          <a:lstStyle>
-            <a:lvl1pPr defTabSz="985838" eaLnBrk="0" hangingPunct="0">
-              <a:defRPr sz="8400">
-                <a:solidFill>
-                  <a:schemeClr val="tx1"/>
-                </a:solidFill>
-                <a:latin typeface="Arial" charset="0"/>
-                <a:ea typeface="ＭＳ Ｐゴシック" charset="0"/>
-                <a:cs typeface="ＭＳ Ｐゴシック" charset="0"/>
-              </a:defRPr>
-            </a:lvl1pPr>
-            <a:lvl2pPr marL="37931725" indent="-37474525" defTabSz="985838" eaLnBrk="0" hangingPunct="0">
-              <a:defRPr sz="8400">
-                <a:solidFill>
-                  <a:schemeClr val="tx1"/>
-                </a:solidFill>
-                <a:latin typeface="Arial" charset="0"/>
-                <a:ea typeface="ＭＳ Ｐゴシック" charset="0"/>
-              </a:defRPr>
-            </a:lvl2pPr>
-            <a:lvl3pPr eaLnBrk="0" hangingPunct="0">
-              <a:defRPr sz="8400">
-                <a:solidFill>
-                  <a:schemeClr val="tx1"/>
-                </a:solidFill>
-                <a:latin typeface="Arial" charset="0"/>
-                <a:ea typeface="ＭＳ Ｐゴシック" charset="0"/>
-              </a:defRPr>
-            </a:lvl3pPr>
-            <a:lvl4pPr eaLnBrk="0" hangingPunct="0">
-              <a:defRPr sz="8400">
-                <a:solidFill>
-                  <a:schemeClr val="tx1"/>
-                </a:solidFill>
-                <a:latin typeface="Arial" charset="0"/>
-                <a:ea typeface="ＭＳ Ｐゴシック" charset="0"/>
-              </a:defRPr>
-            </a:lvl4pPr>
-            <a:lvl5pPr eaLnBrk="0" hangingPunct="0">
-              <a:defRPr sz="8400">
-                <a:solidFill>
-                  <a:schemeClr val="tx1"/>
-                </a:solidFill>
-                <a:latin typeface="Arial" charset="0"/>
-                <a:ea typeface="ＭＳ Ｐゴシック" charset="0"/>
-              </a:defRPr>
-            </a:lvl5pPr>
-            <a:lvl6pPr marL="457200" eaLnBrk="0" fontAlgn="base" hangingPunct="0">
-              <a:spcBef>
-                <a:spcPct val="0"/>
-              </a:spcBef>
-              <a:spcAft>
-                <a:spcPct val="0"/>
-              </a:spcAft>
-              <a:defRPr sz="8400">
-                <a:solidFill>
-                  <a:schemeClr val="tx1"/>
-                </a:solidFill>
-                <a:latin typeface="Arial" charset="0"/>
-                <a:ea typeface="ＭＳ Ｐゴシック" charset="0"/>
-              </a:defRPr>
-            </a:lvl6pPr>
-            <a:lvl7pPr marL="914400" eaLnBrk="0" fontAlgn="base" hangingPunct="0">
-              <a:spcBef>
-                <a:spcPct val="0"/>
-              </a:spcBef>
-              <a:spcAft>
-                <a:spcPct val="0"/>
-              </a:spcAft>
-              <a:defRPr sz="8400">
-                <a:solidFill>
-                  <a:schemeClr val="tx1"/>
-                </a:solidFill>
-                <a:latin typeface="Arial" charset="0"/>
-                <a:ea typeface="ＭＳ Ｐゴシック" charset="0"/>
-              </a:defRPr>
-            </a:lvl7pPr>
-            <a:lvl8pPr marL="1371600" eaLnBrk="0" fontAlgn="base" hangingPunct="0">
-              <a:spcBef>
-                <a:spcPct val="0"/>
-              </a:spcBef>
-              <a:spcAft>
-                <a:spcPct val="0"/>
-              </a:spcAft>
-              <a:defRPr sz="8400">
-                <a:solidFill>
-                  <a:schemeClr val="tx1"/>
-                </a:solidFill>
-                <a:latin typeface="Arial" charset="0"/>
-                <a:ea typeface="ＭＳ Ｐゴシック" charset="0"/>
-              </a:defRPr>
-            </a:lvl8pPr>
-            <a:lvl9pPr marL="1828800" eaLnBrk="0" fontAlgn="base" hangingPunct="0">
-              <a:spcBef>
-                <a:spcPct val="0"/>
-              </a:spcBef>
-              <a:spcAft>
-                <a:spcPct val="0"/>
-              </a:spcAft>
-              <a:defRPr sz="8400">
-                <a:solidFill>
-                  <a:schemeClr val="tx1"/>
-                </a:solidFill>
-                <a:latin typeface="Arial" charset="0"/>
-                <a:ea typeface="ＭＳ Ｐゴシック" charset="0"/>
-              </a:defRPr>
-            </a:lvl9pPr>
-          </a:lstStyle>
-          <a:p>
-            <a:pPr algn="ctr" eaLnBrk="1" hangingPunct="1">
-              <a:spcBef>
-                <a:spcPct val="50000"/>
-              </a:spcBef>
-            </a:pPr>
-            <a:r>
-              <a:rPr lang="en-US" sz="4100" b="1" dirty="0">
-                <a:solidFill>
-                  <a:srgbClr val="1B390A"/>
-                </a:solidFill>
-                <a:effectLst>
-                  <a:outerShdw blurRad="38100" dist="38100" dir="2700000" algn="tl">
-                    <a:srgbClr val="DDDDDD"/>
-                  </a:outerShdw>
-                </a:effectLst>
-              </a:rPr>
-              <a:t>Requirements</a:t>
-            </a:r>
-          </a:p>
-        </p:txBody>
-      </p:sp>
-      <p:sp>
-        <p:nvSpPr>
           <p:cNvPr id="37" name="Text Box 19"/>
           <p:cNvSpPr txBox="1">
             <a:spLocks noChangeArrowheads="1"/>
@@ -6225,7 +5881,7 @@
       </p:pic>
       <p:pic>
         <p:nvPicPr>
-          <p:cNvPr id="4" name="Picture 3" descr="Javascript_logo_unofficial-300x300.png"/>
+          <p:cNvPr id="5" name="Picture 4" descr="mysql-logo[1].png"/>
           <p:cNvPicPr>
             <a:picLocks noChangeAspect="1"/>
           </p:cNvPicPr>
@@ -6245,8 +5901,8 @@
         </p:blipFill>
         <p:spPr>
           <a:xfrm>
-            <a:off x="5410200" y="2133600"/>
-            <a:ext cx="2895600" cy="2895600"/>
+            <a:off x="25831800" y="2590800"/>
+            <a:ext cx="4789714" cy="2514600"/>
           </a:xfrm>
           <a:prstGeom prst="rect">
             <a:avLst/>
@@ -6255,7 +5911,7 @@
       </p:pic>
       <p:pic>
         <p:nvPicPr>
-          <p:cNvPr id="5" name="Picture 4" descr="mysql-logo[1].png"/>
+          <p:cNvPr id="9" name="Picture 8" descr="ShowImage.png"/>
           <p:cNvPicPr>
             <a:picLocks noChangeAspect="1"/>
           </p:cNvPicPr>
@@ -6275,8 +5931,8 @@
         </p:blipFill>
         <p:spPr>
           <a:xfrm>
-            <a:off x="25831800" y="2590800"/>
-            <a:ext cx="4789714" cy="2514600"/>
+            <a:off x="5791200" y="9296400"/>
+            <a:ext cx="4038600" cy="3998214"/>
           </a:xfrm>
           <a:prstGeom prst="rect">
             <a:avLst/>
@@ -6285,7 +5941,7 @@
       </p:pic>
       <p:pic>
         <p:nvPicPr>
-          <p:cNvPr id="9" name="Picture 8" descr="ShowImage.png"/>
+          <p:cNvPr id="11" name="Picture 10" descr="spring-tool-suite-project-logo.png"/>
           <p:cNvPicPr>
             <a:picLocks noChangeAspect="1"/>
           </p:cNvPicPr>
@@ -6305,66 +5961,6 @@
         </p:blipFill>
         <p:spPr>
           <a:xfrm>
-            <a:off x="381000" y="381000"/>
-            <a:ext cx="4038600" cy="3998214"/>
-          </a:xfrm>
-          <a:prstGeom prst="rect">
-            <a:avLst/>
-          </a:prstGeom>
-        </p:spPr>
-      </p:pic>
-      <p:pic>
-        <p:nvPicPr>
-          <p:cNvPr id="10" name="Picture 9" descr="sencha-touch-logo-tizen-experts.png"/>
-          <p:cNvPicPr>
-            <a:picLocks noChangeAspect="1"/>
-          </p:cNvPicPr>
-          <p:nvPr/>
-        </p:nvPicPr>
-        <p:blipFill>
-          <a:blip r:embed="rId9">
-            <a:extLst>
-              <a:ext uri="{28A0092B-C50C-407E-A947-70E740481C1C}">
-                <a14:useLocalDpi xmlns:a14="http://schemas.microsoft.com/office/drawing/2010/main" val="0"/>
-              </a:ext>
-            </a:extLst>
-          </a:blip>
-          <a:stretch>
-            <a:fillRect/>
-          </a:stretch>
-        </p:blipFill>
-        <p:spPr>
-          <a:xfrm>
-            <a:off x="4419600" y="304800"/>
-            <a:ext cx="5080000" cy="2120900"/>
-          </a:xfrm>
-          <a:prstGeom prst="rect">
-            <a:avLst/>
-          </a:prstGeom>
-        </p:spPr>
-      </p:pic>
-      <p:pic>
-        <p:nvPicPr>
-          <p:cNvPr id="11" name="Picture 10" descr="spring-tool-suite-project-logo.png"/>
-          <p:cNvPicPr>
-            <a:picLocks noChangeAspect="1"/>
-          </p:cNvPicPr>
-          <p:nvPr/>
-        </p:nvPicPr>
-        <p:blipFill>
-          <a:blip r:embed="rId10">
-            <a:extLst>
-              <a:ext uri="{28A0092B-C50C-407E-A947-70E740481C1C}">
-                <a14:useLocalDpi xmlns:a14="http://schemas.microsoft.com/office/drawing/2010/main" val="0"/>
-              </a:ext>
-            </a:extLst>
-          </a:blip>
-          <a:stretch>
-            <a:fillRect/>
-          </a:stretch>
-        </p:blipFill>
-        <p:spPr>
-          <a:xfrm>
             <a:off x="29337000" y="381000"/>
             <a:ext cx="2717800" cy="3009900"/>
           </a:xfrm>
@@ -6381,8 +5977,8 @@
         </p:nvSpPr>
         <p:spPr>
           <a:xfrm>
-            <a:off x="1524000" y="31996350"/>
-            <a:ext cx="9753600" cy="7094250"/>
+            <a:off x="1524000" y="32315289"/>
+            <a:ext cx="9753600" cy="5632311"/>
           </a:xfrm>
           <a:prstGeom prst="rect">
             <a:avLst/>
@@ -6396,56 +5992,52 @@
           <a:lstStyle/>
           <a:p>
             <a:r>
-              <a:rPr lang="en-US" sz="3500" dirty="0" smtClean="0"/>
-              <a:t>After all the work that was implemented for this project, the application can </a:t>
-            </a:r>
-            <a:r>
-              <a:rPr lang="en-US" sz="3500" dirty="0" smtClean="0"/>
-              <a:t>now</a:t>
-            </a:r>
-          </a:p>
-          <a:p>
-            <a:r>
-              <a:rPr lang="en-US" sz="3500" dirty="0" smtClean="0"/>
+              <a:rPr lang="en-US" sz="3000" dirty="0" smtClean="0"/>
+              <a:t>After all the work that was implemented for this project, the application can now</a:t>
+            </a:r>
+          </a:p>
+          <a:p>
+            <a:r>
+              <a:rPr lang="en-US" sz="3000" dirty="0" smtClean="0"/>
               <a:t>be used for tracking the Pinecrest People Mover bus, show all stops, and estimate arrival time for the bus to a stop. </a:t>
             </a:r>
             <a:br>
-              <a:rPr lang="en-US" sz="3500" dirty="0" smtClean="0"/>
+              <a:rPr lang="en-US" sz="3000" dirty="0" smtClean="0"/>
             </a:br>
             <a:r>
-              <a:rPr lang="en-US" sz="3500" dirty="0" smtClean="0"/>
+              <a:rPr lang="en-US" sz="3000" dirty="0" smtClean="0"/>
               <a:t/>
             </a:r>
             <a:br>
-              <a:rPr lang="en-US" sz="3500" dirty="0" smtClean="0"/>
+              <a:rPr lang="en-US" sz="3000" dirty="0" smtClean="0"/>
             </a:br>
             <a:r>
-              <a:rPr lang="en-US" sz="3500" dirty="0" smtClean="0"/>
+              <a:rPr lang="en-US" sz="3000" dirty="0" smtClean="0"/>
               <a:t>With the help of Maurice </a:t>
             </a:r>
             <a:r>
-              <a:rPr lang="en-US" sz="3500" dirty="0" err="1" smtClean="0"/>
+              <a:rPr lang="en-US" sz="3000" dirty="0" err="1" smtClean="0"/>
               <a:t>Pruna</a:t>
             </a:r>
             <a:r>
-              <a:rPr lang="en-US" sz="3500" dirty="0" smtClean="0"/>
+              <a:rPr lang="en-US" sz="3000" dirty="0" smtClean="0"/>
               <a:t>, who was mainly in charge of the back end, the application will only have a 10 second delay when information is being updated. </a:t>
             </a:r>
             <a:br>
-              <a:rPr lang="en-US" sz="3500" dirty="0" smtClean="0"/>
+              <a:rPr lang="en-US" sz="3000" dirty="0" smtClean="0"/>
             </a:br>
             <a:r>
-              <a:rPr lang="en-US" sz="3500" dirty="0" smtClean="0"/>
+              <a:rPr lang="en-US" sz="3000" dirty="0" smtClean="0"/>
               <a:t/>
             </a:r>
             <a:br>
-              <a:rPr lang="en-US" sz="3500" dirty="0" smtClean="0"/>
+              <a:rPr lang="en-US" sz="3000" dirty="0" smtClean="0"/>
             </a:br>
             <a:r>
-              <a:rPr lang="en-US" sz="3500" dirty="0" smtClean="0"/>
+              <a:rPr lang="en-US" sz="3000" dirty="0" smtClean="0"/>
               <a:t>The application is compatible with both web and mobile devices.</a:t>
             </a:r>
-            <a:endParaRPr lang="en-US" sz="3500" dirty="0"/>
+            <a:endParaRPr lang="en-US" sz="3000" dirty="0"/>
           </a:p>
         </p:txBody>
       </p:sp>
@@ -6457,8 +6049,8 @@
         </p:nvSpPr>
         <p:spPr>
           <a:xfrm>
-            <a:off x="22326600" y="23850600"/>
-            <a:ext cx="9372600" cy="5478423"/>
+            <a:off x="22326600" y="24255948"/>
+            <a:ext cx="9372600" cy="3785652"/>
           </a:xfrm>
           <a:prstGeom prst="rect">
             <a:avLst/>
@@ -6472,194 +6064,22 @@
           <a:lstStyle/>
           <a:p>
             <a:r>
-              <a:rPr lang="en-US" sz="3500" dirty="0" smtClean="0"/>
+              <a:rPr lang="en-US" sz="3000" dirty="0" smtClean="0"/>
               <a:t>Testing for this project was divided into two sections: system testing and integration testing. Above is an example of a system test case.</a:t>
             </a:r>
             <a:br>
-              <a:rPr lang="en-US" sz="3500" dirty="0" smtClean="0"/>
+              <a:rPr lang="en-US" sz="3000" dirty="0" smtClean="0"/>
             </a:br>
-            <a:endParaRPr lang="en-US" sz="3500" dirty="0"/>
-          </a:p>
-          <a:p>
-            <a:r>
-              <a:rPr lang="en-US" sz="3500" b="1" dirty="0" smtClean="0"/>
+            <a:endParaRPr lang="en-US" sz="3000" dirty="0"/>
+          </a:p>
+          <a:p>
+            <a:r>
+              <a:rPr lang="en-US" sz="3000" b="1" dirty="0" smtClean="0"/>
               <a:t>System Testing </a:t>
             </a:r>
             <a:r>
-              <a:rPr lang="en-US" sz="3500" dirty="0" smtClean="0"/>
+              <a:rPr lang="en-US" sz="3000" dirty="0" smtClean="0"/>
               <a:t>– Dealt with the overall interaction of the user with the system, which was done manually. For each requirement, 3 test cases were completed, two sunny day and one rainy day</a:t>
-            </a:r>
-          </a:p>
-        </p:txBody>
-      </p:sp>
-      <p:sp>
-        <p:nvSpPr>
-          <p:cNvPr id="215" name="Text Box 19"/>
-          <p:cNvSpPr txBox="1">
-            <a:spLocks noChangeArrowheads="1"/>
-          </p:cNvSpPr>
-          <p:nvPr/>
-        </p:nvSpPr>
-        <p:spPr bwMode="auto">
-          <a:xfrm>
-            <a:off x="4114800" y="5973763"/>
-            <a:ext cx="5486400" cy="731837"/>
-          </a:xfrm>
-          <a:prstGeom prst="rect">
-            <a:avLst/>
-          </a:prstGeom>
-          <a:solidFill>
-            <a:srgbClr val="B6A674"/>
-          </a:solidFill>
-          <a:ln>
-            <a:headEnd/>
-            <a:tailEnd/>
-          </a:ln>
-        </p:spPr>
-        <p:style>
-          <a:lnRef idx="1">
-            <a:schemeClr val="dk1"/>
-          </a:lnRef>
-          <a:fillRef idx="2">
-            <a:schemeClr val="dk1"/>
-          </a:fillRef>
-          <a:effectRef idx="1">
-            <a:schemeClr val="dk1"/>
-          </a:effectRef>
-          <a:fontRef idx="minor">
-            <a:schemeClr val="dk1"/>
-          </a:fontRef>
-        </p:style>
-        <p:txBody>
-          <a:bodyPr lIns="98655" tIns="49327" rIns="98655" bIns="49327">
-            <a:spAutoFit/>
-          </a:bodyPr>
-          <a:lstStyle>
-            <a:lvl1pPr defTabSz="985838" eaLnBrk="0" hangingPunct="0">
-              <a:defRPr sz="8400">
-                <a:solidFill>
-                  <a:schemeClr val="tx1"/>
-                </a:solidFill>
-                <a:latin typeface="Arial" charset="0"/>
-                <a:ea typeface="ＭＳ Ｐゴシック" charset="0"/>
-                <a:cs typeface="ＭＳ Ｐゴシック" charset="0"/>
-              </a:defRPr>
-            </a:lvl1pPr>
-            <a:lvl2pPr marL="37931725" indent="-37474525" defTabSz="985838" eaLnBrk="0" hangingPunct="0">
-              <a:defRPr sz="8400">
-                <a:solidFill>
-                  <a:schemeClr val="tx1"/>
-                </a:solidFill>
-                <a:latin typeface="Arial" charset="0"/>
-                <a:ea typeface="ＭＳ Ｐゴシック" charset="0"/>
-              </a:defRPr>
-            </a:lvl2pPr>
-            <a:lvl3pPr eaLnBrk="0" hangingPunct="0">
-              <a:defRPr sz="8400">
-                <a:solidFill>
-                  <a:schemeClr val="tx1"/>
-                </a:solidFill>
-                <a:latin typeface="Arial" charset="0"/>
-                <a:ea typeface="ＭＳ Ｐゴシック" charset="0"/>
-              </a:defRPr>
-            </a:lvl3pPr>
-            <a:lvl4pPr eaLnBrk="0" hangingPunct="0">
-              <a:defRPr sz="8400">
-                <a:solidFill>
-                  <a:schemeClr val="tx1"/>
-                </a:solidFill>
-                <a:latin typeface="Arial" charset="0"/>
-                <a:ea typeface="ＭＳ Ｐゴシック" charset="0"/>
-              </a:defRPr>
-            </a:lvl4pPr>
-            <a:lvl5pPr eaLnBrk="0" hangingPunct="0">
-              <a:defRPr sz="8400">
-                <a:solidFill>
-                  <a:schemeClr val="tx1"/>
-                </a:solidFill>
-                <a:latin typeface="Arial" charset="0"/>
-                <a:ea typeface="ＭＳ Ｐゴシック" charset="0"/>
-              </a:defRPr>
-            </a:lvl5pPr>
-            <a:lvl6pPr marL="457200" eaLnBrk="0" fontAlgn="base" hangingPunct="0">
-              <a:spcBef>
-                <a:spcPct val="0"/>
-              </a:spcBef>
-              <a:spcAft>
-                <a:spcPct val="0"/>
-              </a:spcAft>
-              <a:defRPr sz="8400">
-                <a:solidFill>
-                  <a:schemeClr val="tx1"/>
-                </a:solidFill>
-                <a:latin typeface="Arial" charset="0"/>
-                <a:ea typeface="ＭＳ Ｐゴシック" charset="0"/>
-              </a:defRPr>
-            </a:lvl6pPr>
-            <a:lvl7pPr marL="914400" eaLnBrk="0" fontAlgn="base" hangingPunct="0">
-              <a:spcBef>
-                <a:spcPct val="0"/>
-              </a:spcBef>
-              <a:spcAft>
-                <a:spcPct val="0"/>
-              </a:spcAft>
-              <a:defRPr sz="8400">
-                <a:solidFill>
-                  <a:schemeClr val="tx1"/>
-                </a:solidFill>
-                <a:latin typeface="Arial" charset="0"/>
-                <a:ea typeface="ＭＳ Ｐゴシック" charset="0"/>
-              </a:defRPr>
-            </a:lvl7pPr>
-            <a:lvl8pPr marL="1371600" eaLnBrk="0" fontAlgn="base" hangingPunct="0">
-              <a:spcBef>
-                <a:spcPct val="0"/>
-              </a:spcBef>
-              <a:spcAft>
-                <a:spcPct val="0"/>
-              </a:spcAft>
-              <a:defRPr sz="8400">
-                <a:solidFill>
-                  <a:schemeClr val="tx1"/>
-                </a:solidFill>
-                <a:latin typeface="Arial" charset="0"/>
-                <a:ea typeface="ＭＳ Ｐゴシック" charset="0"/>
-              </a:defRPr>
-            </a:lvl8pPr>
-            <a:lvl9pPr marL="1828800" eaLnBrk="0" fontAlgn="base" hangingPunct="0">
-              <a:spcBef>
-                <a:spcPct val="0"/>
-              </a:spcBef>
-              <a:spcAft>
-                <a:spcPct val="0"/>
-              </a:spcAft>
-              <a:defRPr sz="8400">
-                <a:solidFill>
-                  <a:schemeClr val="tx1"/>
-                </a:solidFill>
-                <a:latin typeface="Arial" charset="0"/>
-                <a:ea typeface="ＭＳ Ｐゴシック" charset="0"/>
-              </a:defRPr>
-            </a:lvl9pPr>
-          </a:lstStyle>
-          <a:p>
-            <a:pPr algn="ctr" eaLnBrk="1" hangingPunct="1">
-              <a:spcBef>
-                <a:spcPct val="50000"/>
-              </a:spcBef>
-            </a:pPr>
-            <a:r>
-              <a:rPr lang="en-US" sz="4100" b="1" dirty="0">
-                <a:solidFill>
-                  <a:srgbClr val="1B390A"/>
-                </a:solidFill>
-                <a:effectLst>
-                  <a:outerShdw blurRad="38100" dist="38100" dir="2700000" algn="tl">
-                    <a:srgbClr val="DDDDDD"/>
-                  </a:outerShdw>
-                </a:effectLst>
-              </a:rPr>
-              <a:t>Problem</a:t>
             </a:r>
           </a:p>
         </p:txBody>
@@ -6686,12 +6106,12 @@
           <a:graphicData uri="http://schemas.openxmlformats.org/presentationml/2006/ole">
             <mc:AlternateContent xmlns:mc="http://schemas.openxmlformats.org/markup-compatibility/2006">
               <mc:Choice xmlns:v="urn:schemas-microsoft-com:vml" Requires="v">
-                <p:oleObj spid="_x0000_s1034" name="Document" r:id="rId11" imgW="5638800" imgH="2413000" progId="Word.Document.12">
+                <p:oleObj spid="_x0000_s1040" name="Document" r:id="rId9" imgW="5638800" imgH="2413000" progId="Word.Document.12">
                   <p:embed/>
                 </p:oleObj>
               </mc:Choice>
               <mc:Fallback>
-                <p:oleObj name="Document" r:id="rId11" imgW="5638800" imgH="2413000" progId="Word.Document.12">
+                <p:oleObj name="Document" r:id="rId9" imgW="5638800" imgH="2413000" progId="Word.Document.12">
                   <p:embed/>
                   <p:pic>
                     <p:nvPicPr>
@@ -6700,7 +6120,7 @@
                       <p:nvPr/>
                     </p:nvPicPr>
                     <p:blipFill>
-                      <a:blip r:embed="rId12"/>
+                      <a:blip r:embed="rId10"/>
                       <a:stretch>
                         <a:fillRect/>
                       </a:stretch>
@@ -6730,7 +6150,7 @@
           <p:nvPr/>
         </p:nvPicPr>
         <p:blipFill>
-          <a:blip r:embed="rId13">
+          <a:blip r:embed="rId11">
             <a:extLst>
               <a:ext uri="{28A0092B-C50C-407E-A947-70E740481C1C}">
                 <a14:useLocalDpi xmlns:a14="http://schemas.microsoft.com/office/drawing/2010/main" val="0"/>
@@ -6760,7 +6180,7 @@
           <p:nvPr/>
         </p:nvPicPr>
         <p:blipFill>
-          <a:blip r:embed="rId14">
+          <a:blip r:embed="rId12">
             <a:extLst>
               <a:ext uri="{28A0092B-C50C-407E-A947-70E740481C1C}">
                 <a14:useLocalDpi xmlns:a14="http://schemas.microsoft.com/office/drawing/2010/main" val="0"/>
@@ -6784,6 +6204,688 @@
       <p:pic>
         <p:nvPicPr>
           <p:cNvPr id="29" name="Picture 28" descr="EstimatedTime.png"/>
+          <p:cNvPicPr>
+            <a:picLocks noChangeAspect="1"/>
+          </p:cNvPicPr>
+          <p:nvPr/>
+        </p:nvPicPr>
+        <p:blipFill>
+          <a:blip r:embed="rId13">
+            <a:extLst>
+              <a:ext uri="{28A0092B-C50C-407E-A947-70E740481C1C}">
+                <a14:useLocalDpi xmlns:a14="http://schemas.microsoft.com/office/drawing/2010/main" val="0"/>
+              </a:ext>
+            </a:extLst>
+          </a:blip>
+          <a:stretch>
+            <a:fillRect/>
+          </a:stretch>
+        </p:blipFill>
+        <p:spPr>
+          <a:xfrm>
+            <a:off x="1752600" y="19758464"/>
+            <a:ext cx="9144000" cy="8600064"/>
+          </a:xfrm>
+          <a:prstGeom prst="rect">
+            <a:avLst/>
+          </a:prstGeom>
+        </p:spPr>
+      </p:pic>
+      <p:sp>
+        <p:nvSpPr>
+          <p:cNvPr id="30" name="Rectangle 29"/>
+          <p:cNvSpPr/>
+          <p:nvPr/>
+        </p:nvSpPr>
+        <p:spPr bwMode="auto">
+          <a:xfrm>
+            <a:off x="1371600" y="6858000"/>
+            <a:ext cx="30251400" cy="11353800"/>
+          </a:xfrm>
+          <a:prstGeom prst="rect">
+            <a:avLst/>
+          </a:prstGeom>
+          <a:solidFill>
+            <a:srgbClr val="FFFFFF"/>
+          </a:solidFill>
+          <a:ln w="9525" cap="flat" cmpd="sng" algn="ctr">
+            <a:noFill/>
+            <a:prstDash val="solid"/>
+            <a:round/>
+            <a:headEnd type="none" w="med" len="med"/>
+            <a:tailEnd type="none" w="med" len="med"/>
+          </a:ln>
+          <a:effectLst/>
+        </p:spPr>
+        <p:txBody>
+          <a:bodyPr vert="horz" wrap="square" lIns="91440" tIns="45720" rIns="91440" bIns="45720" numCol="1" rtlCol="0" anchor="t" anchorCtr="0" compatLnSpc="1">
+            <a:prstTxWarp prst="textNoShape">
+              <a:avLst/>
+            </a:prstTxWarp>
+          </a:bodyPr>
+          <a:lstStyle/>
+          <a:p>
+            <a:pPr marL="0" marR="0" indent="0" algn="l" defTabSz="4284663" rtl="0" eaLnBrk="1" fontAlgn="base" latinLnBrk="0" hangingPunct="1">
+              <a:lnSpc>
+                <a:spcPct val="100000"/>
+              </a:lnSpc>
+              <a:spcBef>
+                <a:spcPct val="0"/>
+              </a:spcBef>
+              <a:spcAft>
+                <a:spcPct val="0"/>
+              </a:spcAft>
+              <a:buClrTx/>
+              <a:buSzTx/>
+              <a:buFontTx/>
+              <a:buNone/>
+              <a:tabLst/>
+            </a:pPr>
+            <a:endParaRPr kumimoji="0" lang="en-US" sz="8400" b="0" i="0" u="none" strike="noStrike" cap="none" normalizeH="0" baseline="0" smtClean="0">
+              <a:ln>
+                <a:noFill/>
+              </a:ln>
+              <a:solidFill>
+                <a:schemeClr val="tx1"/>
+              </a:solidFill>
+              <a:effectLst/>
+              <a:latin typeface="Arial" charset="0"/>
+            </a:endParaRPr>
+          </a:p>
+        </p:txBody>
+      </p:sp>
+      <p:sp>
+        <p:nvSpPr>
+          <p:cNvPr id="12" name="TextBox 11"/>
+          <p:cNvSpPr txBox="1">
+            <a:spLocks/>
+          </p:cNvSpPr>
+          <p:nvPr/>
+        </p:nvSpPr>
+        <p:spPr>
+          <a:xfrm>
+            <a:off x="2895600" y="7604165"/>
+            <a:ext cx="8077200" cy="7940635"/>
+          </a:xfrm>
+          <a:prstGeom prst="rect">
+            <a:avLst/>
+          </a:prstGeom>
+          <a:noFill/>
+        </p:spPr>
+        <p:txBody>
+          <a:bodyPr wrap="square" rtlCol="0">
+            <a:spAutoFit/>
+          </a:bodyPr>
+          <a:lstStyle/>
+          <a:p>
+            <a:r>
+              <a:rPr lang="en-US" sz="3000" dirty="0" smtClean="0"/>
+              <a:t>The Pinecrest People Mover goes beyond the limits of a regular school bus. </a:t>
+            </a:r>
+          </a:p>
+          <a:p>
+            <a:pPr marL="457200" indent="-457200">
+              <a:buFont typeface="Arial"/>
+              <a:buChar char="•"/>
+            </a:pPr>
+            <a:r>
+              <a:rPr lang="en-US" sz="3000" dirty="0" smtClean="0"/>
+              <a:t>Trolley gives students in the Village of Pinecrest an opportunity arrive to their local middle and high school from a location close to home.</a:t>
+            </a:r>
+          </a:p>
+          <a:p>
+            <a:pPr marL="457200" indent="-457200">
+              <a:buFont typeface="Arial"/>
+              <a:buChar char="•"/>
+            </a:pPr>
+            <a:r>
+              <a:rPr lang="en-US" sz="3000" dirty="0"/>
+              <a:t>C</a:t>
+            </a:r>
+            <a:r>
+              <a:rPr lang="en-US" sz="3000" dirty="0" smtClean="0"/>
+              <a:t>urrently there is no system that will keep track of these trolleys. </a:t>
+            </a:r>
+            <a:endParaRPr lang="en-US" sz="3000" dirty="0"/>
+          </a:p>
+          <a:p>
+            <a:pPr marL="457200" indent="-457200">
+              <a:buFont typeface="Arial"/>
+              <a:buChar char="•"/>
+            </a:pPr>
+            <a:r>
+              <a:rPr lang="en-US" sz="3000" dirty="0" smtClean="0"/>
+              <a:t>Parents and students do not know how far a trolley is from their stop nor have the knowledge of the closest stop to their location.</a:t>
+            </a:r>
+            <a:br>
+              <a:rPr lang="en-US" sz="3000" dirty="0" smtClean="0"/>
+            </a:br>
+            <a:endParaRPr lang="en-US" sz="3000" dirty="0" smtClean="0"/>
+          </a:p>
+          <a:p>
+            <a:r>
+              <a:rPr lang="en-US" sz="3000" b="1" i="1" dirty="0" smtClean="0"/>
+              <a:t> The problem I had to tackle was to show the estimated arrival time of the bus for a particular stop, the location of the stop, and display the routes.</a:t>
+            </a:r>
+            <a:endParaRPr lang="en-US" sz="3000" b="1" i="1" dirty="0"/>
+          </a:p>
+        </p:txBody>
+      </p:sp>
+      <p:sp>
+        <p:nvSpPr>
+          <p:cNvPr id="6" name="TextBox 5"/>
+          <p:cNvSpPr txBox="1"/>
+          <p:nvPr/>
+        </p:nvSpPr>
+        <p:spPr>
+          <a:xfrm>
+            <a:off x="13030200" y="7696200"/>
+            <a:ext cx="7239000" cy="3785652"/>
+          </a:xfrm>
+          <a:prstGeom prst="rect">
+            <a:avLst/>
+          </a:prstGeom>
+          <a:noFill/>
+        </p:spPr>
+        <p:txBody>
+          <a:bodyPr wrap="square" rtlCol="0">
+            <a:spAutoFit/>
+          </a:bodyPr>
+          <a:lstStyle/>
+          <a:p>
+            <a:r>
+              <a:rPr lang="en-US" sz="3000" dirty="0" smtClean="0"/>
+              <a:t>Currently, there are several trolley or bus trackers in Miami. However, there are no applications that focus only on the Village of Pinecrest. </a:t>
+            </a:r>
+            <a:br>
+              <a:rPr lang="en-US" sz="3000" dirty="0" smtClean="0"/>
+            </a:br>
+            <a:r>
+              <a:rPr lang="en-US" sz="3000" dirty="0" smtClean="0"/>
+              <a:t/>
+            </a:r>
+            <a:br>
+              <a:rPr lang="en-US" sz="3000" dirty="0" smtClean="0"/>
+            </a:br>
+            <a:r>
+              <a:rPr lang="en-US" sz="3000" b="1" dirty="0" smtClean="0"/>
+              <a:t>This application was made from scratch with the residents of Pinecrest in mind.</a:t>
+            </a:r>
+            <a:endParaRPr lang="en-US" sz="3000" b="1" dirty="0"/>
+          </a:p>
+        </p:txBody>
+      </p:sp>
+      <p:sp>
+        <p:nvSpPr>
+          <p:cNvPr id="7" name="TextBox 6"/>
+          <p:cNvSpPr txBox="1"/>
+          <p:nvPr/>
+        </p:nvSpPr>
+        <p:spPr>
+          <a:xfrm>
+            <a:off x="23012400" y="7792283"/>
+            <a:ext cx="7543800" cy="4247317"/>
+          </a:xfrm>
+          <a:prstGeom prst="rect">
+            <a:avLst/>
+          </a:prstGeom>
+          <a:noFill/>
+        </p:spPr>
+        <p:txBody>
+          <a:bodyPr wrap="square" rtlCol="0">
+            <a:spAutoFit/>
+          </a:bodyPr>
+          <a:lstStyle/>
+          <a:p>
+            <a:pPr algn="ctr"/>
+            <a:r>
+              <a:rPr lang="en-US" sz="3000" dirty="0" smtClean="0"/>
+              <a:t>Requirements implemented per request of the client that I developed:</a:t>
+            </a:r>
+          </a:p>
+          <a:p>
+            <a:endParaRPr lang="en-US" sz="3000" dirty="0" smtClean="0"/>
+          </a:p>
+          <a:p>
+            <a:pPr marL="457200" indent="-457200">
+              <a:buFont typeface="Wingdings" charset="2"/>
+              <a:buChar char="ü"/>
+            </a:pPr>
+            <a:r>
+              <a:rPr lang="en-US" sz="3000" dirty="0" smtClean="0"/>
+              <a:t>Estimated Time for Given Stop</a:t>
+            </a:r>
+          </a:p>
+          <a:p>
+            <a:pPr marL="457200" indent="-457200">
+              <a:buFont typeface="Wingdings" charset="2"/>
+              <a:buChar char="ü"/>
+            </a:pPr>
+            <a:r>
+              <a:rPr lang="en-US" sz="3000" dirty="0" smtClean="0"/>
+              <a:t>Estimated Time for Favorite Stop</a:t>
+            </a:r>
+          </a:p>
+          <a:p>
+            <a:pPr marL="457200" indent="-457200">
+              <a:buFont typeface="Wingdings" charset="2"/>
+              <a:buChar char="ü"/>
+            </a:pPr>
+            <a:r>
+              <a:rPr lang="en-US" sz="3000" dirty="0" smtClean="0"/>
+              <a:t>Display stops on map</a:t>
+            </a:r>
+          </a:p>
+          <a:p>
+            <a:pPr marL="457200" indent="-457200">
+              <a:buFont typeface="Wingdings" charset="2"/>
+              <a:buChar char="ü"/>
+            </a:pPr>
+            <a:r>
+              <a:rPr lang="en-US" sz="3000" dirty="0" smtClean="0"/>
+              <a:t>Display routes on map using Waypoints</a:t>
+            </a:r>
+          </a:p>
+          <a:p>
+            <a:pPr marL="457200" indent="-457200">
+              <a:buFont typeface="Wingdings" charset="2"/>
+              <a:buChar char="ü"/>
+            </a:pPr>
+            <a:r>
+              <a:rPr lang="en-US" sz="3000" dirty="0" smtClean="0"/>
+              <a:t>Display routes in list view</a:t>
+            </a:r>
+          </a:p>
+          <a:p>
+            <a:pPr marL="457200" indent="-457200">
+              <a:buFont typeface="Wingdings" charset="2"/>
+              <a:buChar char="ü"/>
+            </a:pPr>
+            <a:r>
+              <a:rPr lang="en-US" sz="3000" dirty="0" smtClean="0"/>
+              <a:t>Find nearest stop for current location</a:t>
+            </a:r>
+          </a:p>
+        </p:txBody>
+      </p:sp>
+      <p:sp>
+        <p:nvSpPr>
+          <p:cNvPr id="36" name="Text Box 19"/>
+          <p:cNvSpPr txBox="1">
+            <a:spLocks noChangeArrowheads="1"/>
+          </p:cNvSpPr>
+          <p:nvPr/>
+        </p:nvSpPr>
+        <p:spPr bwMode="auto">
+          <a:xfrm>
+            <a:off x="13639800" y="12039600"/>
+            <a:ext cx="5486400" cy="731838"/>
+          </a:xfrm>
+          <a:prstGeom prst="rect">
+            <a:avLst/>
+          </a:prstGeom>
+          <a:solidFill>
+            <a:srgbClr val="B6A674"/>
+          </a:solidFill>
+          <a:ln>
+            <a:headEnd/>
+            <a:tailEnd/>
+          </a:ln>
+        </p:spPr>
+        <p:style>
+          <a:lnRef idx="1">
+            <a:schemeClr val="dk1"/>
+          </a:lnRef>
+          <a:fillRef idx="2">
+            <a:schemeClr val="dk1"/>
+          </a:fillRef>
+          <a:effectRef idx="1">
+            <a:schemeClr val="dk1"/>
+          </a:effectRef>
+          <a:fontRef idx="minor">
+            <a:schemeClr val="dk1"/>
+          </a:fontRef>
+        </p:style>
+        <p:txBody>
+          <a:bodyPr lIns="98655" tIns="49327" rIns="98655" bIns="49327">
+            <a:spAutoFit/>
+          </a:bodyPr>
+          <a:lstStyle>
+            <a:lvl1pPr defTabSz="985838" eaLnBrk="0" hangingPunct="0">
+              <a:defRPr sz="8400">
+                <a:solidFill>
+                  <a:schemeClr val="tx1"/>
+                </a:solidFill>
+                <a:latin typeface="Arial" charset="0"/>
+                <a:ea typeface="ＭＳ Ｐゴシック" charset="0"/>
+                <a:cs typeface="ＭＳ Ｐゴシック" charset="0"/>
+              </a:defRPr>
+            </a:lvl1pPr>
+            <a:lvl2pPr marL="37931725" indent="-37474525" defTabSz="985838" eaLnBrk="0" hangingPunct="0">
+              <a:defRPr sz="8400">
+                <a:solidFill>
+                  <a:schemeClr val="tx1"/>
+                </a:solidFill>
+                <a:latin typeface="Arial" charset="0"/>
+                <a:ea typeface="ＭＳ Ｐゴシック" charset="0"/>
+              </a:defRPr>
+            </a:lvl2pPr>
+            <a:lvl3pPr eaLnBrk="0" hangingPunct="0">
+              <a:defRPr sz="8400">
+                <a:solidFill>
+                  <a:schemeClr val="tx1"/>
+                </a:solidFill>
+                <a:latin typeface="Arial" charset="0"/>
+                <a:ea typeface="ＭＳ Ｐゴシック" charset="0"/>
+              </a:defRPr>
+            </a:lvl3pPr>
+            <a:lvl4pPr eaLnBrk="0" hangingPunct="0">
+              <a:defRPr sz="8400">
+                <a:solidFill>
+                  <a:schemeClr val="tx1"/>
+                </a:solidFill>
+                <a:latin typeface="Arial" charset="0"/>
+                <a:ea typeface="ＭＳ Ｐゴシック" charset="0"/>
+              </a:defRPr>
+            </a:lvl4pPr>
+            <a:lvl5pPr eaLnBrk="0" hangingPunct="0">
+              <a:defRPr sz="8400">
+                <a:solidFill>
+                  <a:schemeClr val="tx1"/>
+                </a:solidFill>
+                <a:latin typeface="Arial" charset="0"/>
+                <a:ea typeface="ＭＳ Ｐゴシック" charset="0"/>
+              </a:defRPr>
+            </a:lvl5pPr>
+            <a:lvl6pPr marL="457200" eaLnBrk="0" fontAlgn="base" hangingPunct="0">
+              <a:spcBef>
+                <a:spcPct val="0"/>
+              </a:spcBef>
+              <a:spcAft>
+                <a:spcPct val="0"/>
+              </a:spcAft>
+              <a:defRPr sz="8400">
+                <a:solidFill>
+                  <a:schemeClr val="tx1"/>
+                </a:solidFill>
+                <a:latin typeface="Arial" charset="0"/>
+                <a:ea typeface="ＭＳ Ｐゴシック" charset="0"/>
+              </a:defRPr>
+            </a:lvl6pPr>
+            <a:lvl7pPr marL="914400" eaLnBrk="0" fontAlgn="base" hangingPunct="0">
+              <a:spcBef>
+                <a:spcPct val="0"/>
+              </a:spcBef>
+              <a:spcAft>
+                <a:spcPct val="0"/>
+              </a:spcAft>
+              <a:defRPr sz="8400">
+                <a:solidFill>
+                  <a:schemeClr val="tx1"/>
+                </a:solidFill>
+                <a:latin typeface="Arial" charset="0"/>
+                <a:ea typeface="ＭＳ Ｐゴシック" charset="0"/>
+              </a:defRPr>
+            </a:lvl7pPr>
+            <a:lvl8pPr marL="1371600" eaLnBrk="0" fontAlgn="base" hangingPunct="0">
+              <a:spcBef>
+                <a:spcPct val="0"/>
+              </a:spcBef>
+              <a:spcAft>
+                <a:spcPct val="0"/>
+              </a:spcAft>
+              <a:defRPr sz="8400">
+                <a:solidFill>
+                  <a:schemeClr val="tx1"/>
+                </a:solidFill>
+                <a:latin typeface="Arial" charset="0"/>
+                <a:ea typeface="ＭＳ Ｐゴシック" charset="0"/>
+              </a:defRPr>
+            </a:lvl8pPr>
+            <a:lvl9pPr marL="1828800" eaLnBrk="0" fontAlgn="base" hangingPunct="0">
+              <a:spcBef>
+                <a:spcPct val="0"/>
+              </a:spcBef>
+              <a:spcAft>
+                <a:spcPct val="0"/>
+              </a:spcAft>
+              <a:defRPr sz="8400">
+                <a:solidFill>
+                  <a:schemeClr val="tx1"/>
+                </a:solidFill>
+                <a:latin typeface="Arial" charset="0"/>
+                <a:ea typeface="ＭＳ Ｐゴシック" charset="0"/>
+              </a:defRPr>
+            </a:lvl9pPr>
+          </a:lstStyle>
+          <a:p>
+            <a:pPr algn="ctr" eaLnBrk="1" hangingPunct="1">
+              <a:spcBef>
+                <a:spcPct val="50000"/>
+              </a:spcBef>
+            </a:pPr>
+            <a:r>
+              <a:rPr lang="en-US" sz="4100" b="1" dirty="0">
+                <a:solidFill>
+                  <a:srgbClr val="1B390A"/>
+                </a:solidFill>
+                <a:effectLst>
+                  <a:outerShdw blurRad="38100" dist="38100" dir="2700000" algn="tl">
+                    <a:srgbClr val="DDDDDD"/>
+                  </a:outerShdw>
+                </a:effectLst>
+              </a:rPr>
+              <a:t>System Design</a:t>
+            </a:r>
+          </a:p>
+        </p:txBody>
+      </p:sp>
+      <p:pic>
+        <p:nvPicPr>
+          <p:cNvPr id="46" name="Picture 45"/>
+          <p:cNvPicPr/>
+          <p:nvPr/>
+        </p:nvPicPr>
+        <p:blipFill>
+          <a:blip r:embed="rId14">
+            <a:extLst>
+              <a:ext uri="{28A0092B-C50C-407E-A947-70E740481C1C}">
+                <a14:useLocalDpi xmlns:a14="http://schemas.microsoft.com/office/drawing/2010/main" val="0"/>
+              </a:ext>
+            </a:extLst>
+          </a:blip>
+          <a:stretch>
+            <a:fillRect/>
+          </a:stretch>
+        </p:blipFill>
+        <p:spPr>
+          <a:xfrm>
+            <a:off x="12877800" y="13106400"/>
+            <a:ext cx="7010400" cy="4191000"/>
+          </a:xfrm>
+          <a:prstGeom prst="rect">
+            <a:avLst/>
+          </a:prstGeom>
+        </p:spPr>
+      </p:pic>
+      <p:sp>
+        <p:nvSpPr>
+          <p:cNvPr id="31" name="Rectangle 30"/>
+          <p:cNvSpPr/>
+          <p:nvPr/>
+        </p:nvSpPr>
+        <p:spPr bwMode="auto">
+          <a:xfrm rot="5400000">
+            <a:off x="7429500" y="23126700"/>
+            <a:ext cx="18592800" cy="9220200"/>
+          </a:xfrm>
+          <a:prstGeom prst="rect">
+            <a:avLst/>
+          </a:prstGeom>
+          <a:solidFill>
+            <a:srgbClr val="1A3908"/>
+          </a:solidFill>
+          <a:ln w="9525" cap="flat" cmpd="sng" algn="ctr">
+            <a:noFill/>
+            <a:prstDash val="solid"/>
+            <a:round/>
+            <a:headEnd type="none" w="med" len="med"/>
+            <a:tailEnd type="none" w="med" len="med"/>
+          </a:ln>
+          <a:effectLst/>
+        </p:spPr>
+        <p:txBody>
+          <a:bodyPr vert="horz" wrap="square" lIns="91440" tIns="45720" rIns="91440" bIns="45720" numCol="1" rtlCol="0" anchor="t" anchorCtr="0" compatLnSpc="1">
+            <a:prstTxWarp prst="textNoShape">
+              <a:avLst/>
+            </a:prstTxWarp>
+          </a:bodyPr>
+          <a:lstStyle/>
+          <a:p>
+            <a:pPr marL="0" marR="0" indent="0" algn="l" defTabSz="4284663" rtl="0" eaLnBrk="1" fontAlgn="base" latinLnBrk="0" hangingPunct="1">
+              <a:lnSpc>
+                <a:spcPct val="100000"/>
+              </a:lnSpc>
+              <a:spcBef>
+                <a:spcPct val="0"/>
+              </a:spcBef>
+              <a:spcAft>
+                <a:spcPct val="0"/>
+              </a:spcAft>
+              <a:buClrTx/>
+              <a:buSzTx/>
+              <a:buFontTx/>
+              <a:buNone/>
+              <a:tabLst/>
+            </a:pPr>
+            <a:endParaRPr kumimoji="0" lang="en-US" sz="8400" b="0" i="0" u="none" strike="noStrike" cap="none" normalizeH="0" baseline="0" smtClean="0">
+              <a:ln>
+                <a:noFill/>
+              </a:ln>
+              <a:solidFill>
+                <a:schemeClr val="tx1"/>
+              </a:solidFill>
+              <a:effectLst/>
+              <a:latin typeface="Arial" charset="0"/>
+            </a:endParaRPr>
+          </a:p>
+        </p:txBody>
+      </p:sp>
+      <p:sp>
+        <p:nvSpPr>
+          <p:cNvPr id="21" name="TextBox 20"/>
+          <p:cNvSpPr txBox="1"/>
+          <p:nvPr/>
+        </p:nvSpPr>
+        <p:spPr>
+          <a:xfrm>
+            <a:off x="14554200" y="34594800"/>
+            <a:ext cx="4191000" cy="1631216"/>
+          </a:xfrm>
+          <a:prstGeom prst="rect">
+            <a:avLst/>
+          </a:prstGeom>
+          <a:noFill/>
+        </p:spPr>
+        <p:txBody>
+          <a:bodyPr wrap="square" rtlCol="0">
+            <a:spAutoFit/>
+          </a:bodyPr>
+          <a:lstStyle/>
+          <a:p>
+            <a:r>
+              <a:rPr lang="en-US" sz="2500" dirty="0" smtClean="0">
+                <a:solidFill>
+                  <a:srgbClr val="B6A674"/>
+                </a:solidFill>
+              </a:rPr>
+              <a:t>Code in the backend was done in the </a:t>
+            </a:r>
+          </a:p>
+          <a:p>
+            <a:r>
+              <a:rPr lang="en-US" sz="2500" dirty="0" smtClean="0">
+                <a:solidFill>
+                  <a:srgbClr val="B6A674"/>
+                </a:solidFill>
+              </a:rPr>
+              <a:t>Spring Tool Suite: </a:t>
+            </a:r>
+          </a:p>
+          <a:p>
+            <a:r>
+              <a:rPr lang="en-US" sz="2500" dirty="0" smtClean="0">
+                <a:solidFill>
+                  <a:srgbClr val="B6A674"/>
+                </a:solidFill>
+              </a:rPr>
+              <a:t>Estimated Time</a:t>
+            </a:r>
+            <a:endParaRPr lang="en-US" sz="2500" dirty="0">
+              <a:solidFill>
+                <a:srgbClr val="B6A674"/>
+              </a:solidFill>
+            </a:endParaRPr>
+          </a:p>
+        </p:txBody>
+      </p:sp>
+      <p:sp>
+        <p:nvSpPr>
+          <p:cNvPr id="22" name="TextBox 21"/>
+          <p:cNvSpPr txBox="1"/>
+          <p:nvPr/>
+        </p:nvSpPr>
+        <p:spPr>
+          <a:xfrm>
+            <a:off x="14859000" y="25755600"/>
+            <a:ext cx="3505200" cy="2015936"/>
+          </a:xfrm>
+          <a:prstGeom prst="rect">
+            <a:avLst/>
+          </a:prstGeom>
+          <a:noFill/>
+        </p:spPr>
+        <p:txBody>
+          <a:bodyPr wrap="square" rtlCol="0">
+            <a:spAutoFit/>
+          </a:bodyPr>
+          <a:lstStyle/>
+          <a:p>
+            <a:r>
+              <a:rPr lang="en-US" sz="2500" dirty="0" smtClean="0">
+                <a:solidFill>
+                  <a:srgbClr val="B6A674"/>
+                </a:solidFill>
+              </a:rPr>
+              <a:t>Sublime Text 2 was used to develop the </a:t>
+            </a:r>
+            <a:r>
+              <a:rPr lang="en-US" sz="2500" dirty="0">
+                <a:solidFill>
+                  <a:srgbClr val="B6A674"/>
+                </a:solidFill>
+              </a:rPr>
+              <a:t>S</a:t>
+            </a:r>
+            <a:r>
+              <a:rPr lang="en-US" sz="2500" dirty="0" smtClean="0">
+                <a:solidFill>
+                  <a:srgbClr val="B6A674"/>
+                </a:solidFill>
+              </a:rPr>
+              <a:t>encha application. Here you can see the Map Controller.</a:t>
+            </a:r>
+            <a:endParaRPr lang="en-US" sz="2500" dirty="0">
+              <a:solidFill>
+                <a:srgbClr val="B6A674"/>
+              </a:solidFill>
+            </a:endParaRPr>
+          </a:p>
+        </p:txBody>
+      </p:sp>
+      <p:pic>
+        <p:nvPicPr>
+          <p:cNvPr id="25" name="Picture 24" descr="Screen Shot 2014-12-03 at 8.28.46 PM.png"/>
           <p:cNvPicPr>
             <a:picLocks noChangeAspect="1"/>
           </p:cNvPicPr>
@@ -6803,717 +6905,6 @@
         </p:blipFill>
         <p:spPr>
           <a:xfrm>
-            <a:off x="1752600" y="19758464"/>
-            <a:ext cx="9144000" cy="8600064"/>
-          </a:xfrm>
-          <a:prstGeom prst="rect">
-            <a:avLst/>
-          </a:prstGeom>
-        </p:spPr>
-      </p:pic>
-      <p:sp>
-        <p:nvSpPr>
-          <p:cNvPr id="30" name="Rectangle 29"/>
-          <p:cNvSpPr/>
-          <p:nvPr/>
-        </p:nvSpPr>
-        <p:spPr bwMode="auto">
-          <a:xfrm>
-            <a:off x="1371600" y="6858000"/>
-            <a:ext cx="30251400" cy="11353800"/>
-          </a:xfrm>
-          <a:prstGeom prst="rect">
-            <a:avLst/>
-          </a:prstGeom>
-          <a:solidFill>
-            <a:srgbClr val="FFFFFF"/>
-          </a:solidFill>
-          <a:ln w="9525" cap="flat" cmpd="sng" algn="ctr">
-            <a:noFill/>
-            <a:prstDash val="solid"/>
-            <a:round/>
-            <a:headEnd type="none" w="med" len="med"/>
-            <a:tailEnd type="none" w="med" len="med"/>
-          </a:ln>
-          <a:effectLst/>
-        </p:spPr>
-        <p:txBody>
-          <a:bodyPr vert="horz" wrap="square" lIns="91440" tIns="45720" rIns="91440" bIns="45720" numCol="1" rtlCol="0" anchor="t" anchorCtr="0" compatLnSpc="1">
-            <a:prstTxWarp prst="textNoShape">
-              <a:avLst/>
-            </a:prstTxWarp>
-          </a:bodyPr>
-          <a:lstStyle/>
-          <a:p>
-            <a:pPr marL="0" marR="0" indent="0" algn="l" defTabSz="4284663" rtl="0" eaLnBrk="1" fontAlgn="base" latinLnBrk="0" hangingPunct="1">
-              <a:lnSpc>
-                <a:spcPct val="100000"/>
-              </a:lnSpc>
-              <a:spcBef>
-                <a:spcPct val="0"/>
-              </a:spcBef>
-              <a:spcAft>
-                <a:spcPct val="0"/>
-              </a:spcAft>
-              <a:buClrTx/>
-              <a:buSzTx/>
-              <a:buFontTx/>
-              <a:buNone/>
-              <a:tabLst/>
-            </a:pPr>
-            <a:endParaRPr kumimoji="0" lang="en-US" sz="8400" b="0" i="0" u="none" strike="noStrike" cap="none" normalizeH="0" baseline="0" smtClean="0">
-              <a:ln>
-                <a:noFill/>
-              </a:ln>
-              <a:solidFill>
-                <a:schemeClr val="tx1"/>
-              </a:solidFill>
-              <a:effectLst/>
-              <a:latin typeface="Arial" charset="0"/>
-            </a:endParaRPr>
-          </a:p>
-        </p:txBody>
-      </p:sp>
-      <p:sp>
-        <p:nvSpPr>
-          <p:cNvPr id="12" name="TextBox 11"/>
-          <p:cNvSpPr txBox="1">
-            <a:spLocks/>
-          </p:cNvSpPr>
-          <p:nvPr/>
-        </p:nvSpPr>
-        <p:spPr>
-          <a:xfrm>
-            <a:off x="2895600" y="7086600"/>
-            <a:ext cx="8077200" cy="10325904"/>
-          </a:xfrm>
-          <a:prstGeom prst="rect">
-            <a:avLst/>
-          </a:prstGeom>
-          <a:noFill/>
-        </p:spPr>
-        <p:txBody>
-          <a:bodyPr wrap="square" rtlCol="0">
-            <a:spAutoFit/>
-          </a:bodyPr>
-          <a:lstStyle/>
-          <a:p>
-            <a:r>
-              <a:rPr lang="en-US" sz="3500" dirty="0" smtClean="0"/>
-              <a:t>The Pinecrest People Mover goes beyond the limits of a regular school bus. </a:t>
-            </a:r>
-            <a:endParaRPr lang="en-US" sz="3500" dirty="0" smtClean="0"/>
-          </a:p>
-          <a:p>
-            <a:pPr marL="457200" indent="-457200">
-              <a:buFont typeface="Arial"/>
-              <a:buChar char="•"/>
-            </a:pPr>
-            <a:r>
-              <a:rPr lang="en-US" sz="3500" dirty="0" smtClean="0"/>
-              <a:t>Trolley </a:t>
-            </a:r>
-            <a:r>
-              <a:rPr lang="en-US" sz="3500" dirty="0" smtClean="0"/>
-              <a:t>gives students in the Village of Pinecrest an opportunity arrive to their local middle and high school from a location close to </a:t>
-            </a:r>
-            <a:r>
-              <a:rPr lang="en-US" sz="3500" dirty="0" smtClean="0"/>
-              <a:t>home.</a:t>
-            </a:r>
-          </a:p>
-          <a:p>
-            <a:pPr marL="457200" indent="-457200">
-              <a:buFont typeface="Arial"/>
-              <a:buChar char="•"/>
-            </a:pPr>
-            <a:r>
-              <a:rPr lang="en-US" sz="3500" dirty="0"/>
-              <a:t>C</a:t>
-            </a:r>
-            <a:r>
-              <a:rPr lang="en-US" sz="3500" dirty="0" smtClean="0"/>
-              <a:t>urrently </a:t>
-            </a:r>
-            <a:r>
-              <a:rPr lang="en-US" sz="3500" dirty="0" smtClean="0"/>
-              <a:t>there is no system that will keep track of these trolleys. </a:t>
-            </a:r>
-            <a:endParaRPr lang="en-US" sz="3500" dirty="0"/>
-          </a:p>
-          <a:p>
-            <a:pPr marL="457200" indent="-457200">
-              <a:buFont typeface="Arial"/>
-              <a:buChar char="•"/>
-            </a:pPr>
-            <a:r>
-              <a:rPr lang="en-US" sz="3500" dirty="0" smtClean="0"/>
-              <a:t>Parents </a:t>
-            </a:r>
-            <a:r>
-              <a:rPr lang="en-US" sz="3500" dirty="0" smtClean="0"/>
-              <a:t>and students do not know how far a trolley is from their stop nor have the knowledge of the closest stop to their location</a:t>
-            </a:r>
-            <a:r>
-              <a:rPr lang="en-US" sz="3500" dirty="0" smtClean="0"/>
-              <a:t>.</a:t>
-            </a:r>
-            <a:br>
-              <a:rPr lang="en-US" sz="3500" dirty="0" smtClean="0"/>
-            </a:br>
-            <a:endParaRPr lang="en-US" sz="3500" dirty="0" smtClean="0"/>
-          </a:p>
-          <a:p>
-            <a:r>
-              <a:rPr lang="en-US" sz="3500" b="1" i="1" dirty="0" smtClean="0"/>
-              <a:t> The problem I had to tackle was to show the estimated arrival time of the bus for a particular stop, the location of the stop, and display the routes.</a:t>
-            </a:r>
-            <a:endParaRPr lang="en-US" sz="3500" b="1" i="1" dirty="0"/>
-          </a:p>
-        </p:txBody>
-      </p:sp>
-      <p:sp>
-        <p:nvSpPr>
-          <p:cNvPr id="6" name="TextBox 5"/>
-          <p:cNvSpPr txBox="1"/>
-          <p:nvPr/>
-        </p:nvSpPr>
-        <p:spPr>
-          <a:xfrm>
-            <a:off x="13030200" y="7086600"/>
-            <a:ext cx="7239000" cy="4401205"/>
-          </a:xfrm>
-          <a:prstGeom prst="rect">
-            <a:avLst/>
-          </a:prstGeom>
-          <a:noFill/>
-        </p:spPr>
-        <p:txBody>
-          <a:bodyPr wrap="square" rtlCol="0">
-            <a:spAutoFit/>
-          </a:bodyPr>
-          <a:lstStyle/>
-          <a:p>
-            <a:r>
-              <a:rPr lang="en-US" sz="3500" dirty="0" smtClean="0"/>
-              <a:t>Currently, there are several trolley or bus trackers in Miami. However, there are no applications that focus only on the Village of Pinecrest. </a:t>
-            </a:r>
-            <a:r>
-              <a:rPr lang="en-US" sz="3500" dirty="0" smtClean="0"/>
-              <a:t/>
-            </a:r>
-            <a:br>
-              <a:rPr lang="en-US" sz="3500" dirty="0" smtClean="0"/>
-            </a:br>
-            <a:r>
-              <a:rPr lang="en-US" sz="3500" dirty="0" smtClean="0"/>
-              <a:t/>
-            </a:r>
-            <a:br>
-              <a:rPr lang="en-US" sz="3500" dirty="0" smtClean="0"/>
-            </a:br>
-            <a:r>
-              <a:rPr lang="en-US" sz="3500" b="1" dirty="0" smtClean="0"/>
-              <a:t>This application was made from scratch with the residents of Pinecrest in mind.</a:t>
-            </a:r>
-            <a:endParaRPr lang="en-US" sz="3500" b="1" dirty="0"/>
-          </a:p>
-        </p:txBody>
-      </p:sp>
-      <p:sp>
-        <p:nvSpPr>
-          <p:cNvPr id="7" name="TextBox 6"/>
-          <p:cNvSpPr txBox="1"/>
-          <p:nvPr/>
-        </p:nvSpPr>
-        <p:spPr>
-          <a:xfrm>
-            <a:off x="23012400" y="7086600"/>
-            <a:ext cx="7543800" cy="6017032"/>
-          </a:xfrm>
-          <a:prstGeom prst="rect">
-            <a:avLst/>
-          </a:prstGeom>
-          <a:noFill/>
-        </p:spPr>
-        <p:txBody>
-          <a:bodyPr wrap="square" rtlCol="0">
-            <a:spAutoFit/>
-          </a:bodyPr>
-          <a:lstStyle/>
-          <a:p>
-            <a:pPr algn="ctr"/>
-            <a:r>
-              <a:rPr lang="en-US" sz="3500" dirty="0" smtClean="0"/>
-              <a:t>Requirements implemented per request of the client that I developed:</a:t>
-            </a:r>
-          </a:p>
-          <a:p>
-            <a:endParaRPr lang="en-US" sz="3500" dirty="0" smtClean="0"/>
-          </a:p>
-          <a:p>
-            <a:pPr marL="457200" indent="-457200">
-              <a:buFont typeface="Wingdings" charset="2"/>
-              <a:buChar char="ü"/>
-            </a:pPr>
-            <a:r>
-              <a:rPr lang="en-US" sz="3500" dirty="0" smtClean="0"/>
-              <a:t>Estimated Time for Given Stop</a:t>
-            </a:r>
-          </a:p>
-          <a:p>
-            <a:pPr marL="457200" indent="-457200">
-              <a:buFont typeface="Wingdings" charset="2"/>
-              <a:buChar char="ü"/>
-            </a:pPr>
-            <a:r>
-              <a:rPr lang="en-US" sz="3500" dirty="0" smtClean="0"/>
-              <a:t>Estimated Time for Favorite Stop</a:t>
-            </a:r>
-          </a:p>
-          <a:p>
-            <a:pPr marL="457200" indent="-457200">
-              <a:buFont typeface="Wingdings" charset="2"/>
-              <a:buChar char="ü"/>
-            </a:pPr>
-            <a:r>
-              <a:rPr lang="en-US" sz="3500" dirty="0" smtClean="0"/>
-              <a:t>Display stops on map</a:t>
-            </a:r>
-          </a:p>
-          <a:p>
-            <a:pPr marL="457200" indent="-457200">
-              <a:buFont typeface="Wingdings" charset="2"/>
-              <a:buChar char="ü"/>
-            </a:pPr>
-            <a:r>
-              <a:rPr lang="en-US" sz="3500" dirty="0" smtClean="0"/>
-              <a:t>Display routes on map using Waypoints</a:t>
-            </a:r>
-          </a:p>
-          <a:p>
-            <a:pPr marL="457200" indent="-457200">
-              <a:buFont typeface="Wingdings" charset="2"/>
-              <a:buChar char="ü"/>
-            </a:pPr>
-            <a:r>
-              <a:rPr lang="en-US" sz="3500" dirty="0" smtClean="0"/>
-              <a:t>Display routes in list view</a:t>
-            </a:r>
-          </a:p>
-          <a:p>
-            <a:pPr marL="457200" indent="-457200">
-              <a:buFont typeface="Wingdings" charset="2"/>
-              <a:buChar char="ü"/>
-            </a:pPr>
-            <a:r>
-              <a:rPr lang="en-US" sz="3500" dirty="0" smtClean="0"/>
-              <a:t>Find nearest stop for current </a:t>
-            </a:r>
-            <a:r>
-              <a:rPr lang="en-US" sz="3500" dirty="0" smtClean="0"/>
-              <a:t>location</a:t>
-            </a:r>
-          </a:p>
-        </p:txBody>
-      </p:sp>
-      <p:sp>
-        <p:nvSpPr>
-          <p:cNvPr id="36" name="Text Box 19"/>
-          <p:cNvSpPr txBox="1">
-            <a:spLocks noChangeArrowheads="1"/>
-          </p:cNvSpPr>
-          <p:nvPr/>
-        </p:nvSpPr>
-        <p:spPr bwMode="auto">
-          <a:xfrm>
-            <a:off x="13639800" y="12039600"/>
-            <a:ext cx="5486400" cy="731838"/>
-          </a:xfrm>
-          <a:prstGeom prst="rect">
-            <a:avLst/>
-          </a:prstGeom>
-          <a:solidFill>
-            <a:srgbClr val="B6A674"/>
-          </a:solidFill>
-          <a:ln>
-            <a:headEnd/>
-            <a:tailEnd/>
-          </a:ln>
-        </p:spPr>
-        <p:style>
-          <a:lnRef idx="1">
-            <a:schemeClr val="dk1"/>
-          </a:lnRef>
-          <a:fillRef idx="2">
-            <a:schemeClr val="dk1"/>
-          </a:fillRef>
-          <a:effectRef idx="1">
-            <a:schemeClr val="dk1"/>
-          </a:effectRef>
-          <a:fontRef idx="minor">
-            <a:schemeClr val="dk1"/>
-          </a:fontRef>
-        </p:style>
-        <p:txBody>
-          <a:bodyPr lIns="98655" tIns="49327" rIns="98655" bIns="49327">
-            <a:spAutoFit/>
-          </a:bodyPr>
-          <a:lstStyle>
-            <a:lvl1pPr defTabSz="985838" eaLnBrk="0" hangingPunct="0">
-              <a:defRPr sz="8400">
-                <a:solidFill>
-                  <a:schemeClr val="tx1"/>
-                </a:solidFill>
-                <a:latin typeface="Arial" charset="0"/>
-                <a:ea typeface="ＭＳ Ｐゴシック" charset="0"/>
-                <a:cs typeface="ＭＳ Ｐゴシック" charset="0"/>
-              </a:defRPr>
-            </a:lvl1pPr>
-            <a:lvl2pPr marL="37931725" indent="-37474525" defTabSz="985838" eaLnBrk="0" hangingPunct="0">
-              <a:defRPr sz="8400">
-                <a:solidFill>
-                  <a:schemeClr val="tx1"/>
-                </a:solidFill>
-                <a:latin typeface="Arial" charset="0"/>
-                <a:ea typeface="ＭＳ Ｐゴシック" charset="0"/>
-              </a:defRPr>
-            </a:lvl2pPr>
-            <a:lvl3pPr eaLnBrk="0" hangingPunct="0">
-              <a:defRPr sz="8400">
-                <a:solidFill>
-                  <a:schemeClr val="tx1"/>
-                </a:solidFill>
-                <a:latin typeface="Arial" charset="0"/>
-                <a:ea typeface="ＭＳ Ｐゴシック" charset="0"/>
-              </a:defRPr>
-            </a:lvl3pPr>
-            <a:lvl4pPr eaLnBrk="0" hangingPunct="0">
-              <a:defRPr sz="8400">
-                <a:solidFill>
-                  <a:schemeClr val="tx1"/>
-                </a:solidFill>
-                <a:latin typeface="Arial" charset="0"/>
-                <a:ea typeface="ＭＳ Ｐゴシック" charset="0"/>
-              </a:defRPr>
-            </a:lvl4pPr>
-            <a:lvl5pPr eaLnBrk="0" hangingPunct="0">
-              <a:defRPr sz="8400">
-                <a:solidFill>
-                  <a:schemeClr val="tx1"/>
-                </a:solidFill>
-                <a:latin typeface="Arial" charset="0"/>
-                <a:ea typeface="ＭＳ Ｐゴシック" charset="0"/>
-              </a:defRPr>
-            </a:lvl5pPr>
-            <a:lvl6pPr marL="457200" eaLnBrk="0" fontAlgn="base" hangingPunct="0">
-              <a:spcBef>
-                <a:spcPct val="0"/>
-              </a:spcBef>
-              <a:spcAft>
-                <a:spcPct val="0"/>
-              </a:spcAft>
-              <a:defRPr sz="8400">
-                <a:solidFill>
-                  <a:schemeClr val="tx1"/>
-                </a:solidFill>
-                <a:latin typeface="Arial" charset="0"/>
-                <a:ea typeface="ＭＳ Ｐゴシック" charset="0"/>
-              </a:defRPr>
-            </a:lvl6pPr>
-            <a:lvl7pPr marL="914400" eaLnBrk="0" fontAlgn="base" hangingPunct="0">
-              <a:spcBef>
-                <a:spcPct val="0"/>
-              </a:spcBef>
-              <a:spcAft>
-                <a:spcPct val="0"/>
-              </a:spcAft>
-              <a:defRPr sz="8400">
-                <a:solidFill>
-                  <a:schemeClr val="tx1"/>
-                </a:solidFill>
-                <a:latin typeface="Arial" charset="0"/>
-                <a:ea typeface="ＭＳ Ｐゴシック" charset="0"/>
-              </a:defRPr>
-            </a:lvl7pPr>
-            <a:lvl8pPr marL="1371600" eaLnBrk="0" fontAlgn="base" hangingPunct="0">
-              <a:spcBef>
-                <a:spcPct val="0"/>
-              </a:spcBef>
-              <a:spcAft>
-                <a:spcPct val="0"/>
-              </a:spcAft>
-              <a:defRPr sz="8400">
-                <a:solidFill>
-                  <a:schemeClr val="tx1"/>
-                </a:solidFill>
-                <a:latin typeface="Arial" charset="0"/>
-                <a:ea typeface="ＭＳ Ｐゴシック" charset="0"/>
-              </a:defRPr>
-            </a:lvl8pPr>
-            <a:lvl9pPr marL="1828800" eaLnBrk="0" fontAlgn="base" hangingPunct="0">
-              <a:spcBef>
-                <a:spcPct val="0"/>
-              </a:spcBef>
-              <a:spcAft>
-                <a:spcPct val="0"/>
-              </a:spcAft>
-              <a:defRPr sz="8400">
-                <a:solidFill>
-                  <a:schemeClr val="tx1"/>
-                </a:solidFill>
-                <a:latin typeface="Arial" charset="0"/>
-                <a:ea typeface="ＭＳ Ｐゴシック" charset="0"/>
-              </a:defRPr>
-            </a:lvl9pPr>
-          </a:lstStyle>
-          <a:p>
-            <a:pPr algn="ctr" eaLnBrk="1" hangingPunct="1">
-              <a:spcBef>
-                <a:spcPct val="50000"/>
-              </a:spcBef>
-            </a:pPr>
-            <a:r>
-              <a:rPr lang="en-US" sz="4100" b="1" dirty="0">
-                <a:solidFill>
-                  <a:srgbClr val="1B390A"/>
-                </a:solidFill>
-                <a:effectLst>
-                  <a:outerShdw blurRad="38100" dist="38100" dir="2700000" algn="tl">
-                    <a:srgbClr val="DDDDDD"/>
-                  </a:outerShdw>
-                </a:effectLst>
-              </a:rPr>
-              <a:t>System Design</a:t>
-            </a:r>
-          </a:p>
-        </p:txBody>
-      </p:sp>
-      <p:pic>
-        <p:nvPicPr>
-          <p:cNvPr id="46" name="Picture 45"/>
-          <p:cNvPicPr/>
-          <p:nvPr/>
-        </p:nvPicPr>
-        <p:blipFill>
-          <a:blip r:embed="rId16">
-            <a:extLst>
-              <a:ext uri="{28A0092B-C50C-407E-A947-70E740481C1C}">
-                <a14:useLocalDpi xmlns:a14="http://schemas.microsoft.com/office/drawing/2010/main" val="0"/>
-              </a:ext>
-            </a:extLst>
-          </a:blip>
-          <a:stretch>
-            <a:fillRect/>
-          </a:stretch>
-        </p:blipFill>
-        <p:spPr>
-          <a:xfrm>
-            <a:off x="12877800" y="13106400"/>
-            <a:ext cx="7010400" cy="4191000"/>
-          </a:xfrm>
-          <a:prstGeom prst="rect">
-            <a:avLst/>
-          </a:prstGeom>
-        </p:spPr>
-      </p:pic>
-      <p:sp>
-        <p:nvSpPr>
-          <p:cNvPr id="31" name="Rectangle 30"/>
-          <p:cNvSpPr/>
-          <p:nvPr/>
-        </p:nvSpPr>
-        <p:spPr bwMode="auto">
-          <a:xfrm rot="5400000">
-            <a:off x="7429500" y="23126700"/>
-            <a:ext cx="18592800" cy="9220200"/>
-          </a:xfrm>
-          <a:prstGeom prst="rect">
-            <a:avLst/>
-          </a:prstGeom>
-          <a:solidFill>
-            <a:srgbClr val="1A3908"/>
-          </a:solidFill>
-          <a:ln w="9525" cap="flat" cmpd="sng" algn="ctr">
-            <a:noFill/>
-            <a:prstDash val="solid"/>
-            <a:round/>
-            <a:headEnd type="none" w="med" len="med"/>
-            <a:tailEnd type="none" w="med" len="med"/>
-          </a:ln>
-          <a:effectLst/>
-        </p:spPr>
-        <p:txBody>
-          <a:bodyPr vert="horz" wrap="square" lIns="91440" tIns="45720" rIns="91440" bIns="45720" numCol="1" rtlCol="0" anchor="t" anchorCtr="0" compatLnSpc="1">
-            <a:prstTxWarp prst="textNoShape">
-              <a:avLst/>
-            </a:prstTxWarp>
-          </a:bodyPr>
-          <a:lstStyle/>
-          <a:p>
-            <a:pPr marL="0" marR="0" indent="0" algn="l" defTabSz="4284663" rtl="0" eaLnBrk="1" fontAlgn="base" latinLnBrk="0" hangingPunct="1">
-              <a:lnSpc>
-                <a:spcPct val="100000"/>
-              </a:lnSpc>
-              <a:spcBef>
-                <a:spcPct val="0"/>
-              </a:spcBef>
-              <a:spcAft>
-                <a:spcPct val="0"/>
-              </a:spcAft>
-              <a:buClrTx/>
-              <a:buSzTx/>
-              <a:buFontTx/>
-              <a:buNone/>
-              <a:tabLst/>
-            </a:pPr>
-            <a:endParaRPr kumimoji="0" lang="en-US" sz="8400" b="0" i="0" u="none" strike="noStrike" cap="none" normalizeH="0" baseline="0" smtClean="0">
-              <a:ln>
-                <a:noFill/>
-              </a:ln>
-              <a:solidFill>
-                <a:schemeClr val="tx1"/>
-              </a:solidFill>
-              <a:effectLst/>
-              <a:latin typeface="Arial" charset="0"/>
-            </a:endParaRPr>
-          </a:p>
-        </p:txBody>
-      </p:sp>
-      <p:sp>
-        <p:nvSpPr>
-          <p:cNvPr id="21" name="TextBox 20"/>
-          <p:cNvSpPr txBox="1"/>
-          <p:nvPr/>
-        </p:nvSpPr>
-        <p:spPr>
-          <a:xfrm>
-            <a:off x="14554200" y="34594800"/>
-            <a:ext cx="4191000" cy="1631216"/>
-          </a:xfrm>
-          <a:prstGeom prst="rect">
-            <a:avLst/>
-          </a:prstGeom>
-          <a:noFill/>
-        </p:spPr>
-        <p:txBody>
-          <a:bodyPr wrap="square" rtlCol="0">
-            <a:spAutoFit/>
-          </a:bodyPr>
-          <a:lstStyle/>
-          <a:p>
-            <a:r>
-              <a:rPr lang="en-US" sz="2500" dirty="0" smtClean="0">
-                <a:solidFill>
-                  <a:srgbClr val="B6A674"/>
-                </a:solidFill>
-              </a:rPr>
-              <a:t>Code in the backed was done in the </a:t>
-            </a:r>
-          </a:p>
-          <a:p>
-            <a:r>
-              <a:rPr lang="en-US" sz="2500" dirty="0" smtClean="0">
-                <a:solidFill>
-                  <a:srgbClr val="B6A674"/>
-                </a:solidFill>
-              </a:rPr>
-              <a:t>Spring Tool Suite: </a:t>
-            </a:r>
-          </a:p>
-          <a:p>
-            <a:r>
-              <a:rPr lang="en-US" sz="2500" dirty="0" smtClean="0">
-                <a:solidFill>
-                  <a:srgbClr val="B6A674"/>
-                </a:solidFill>
-              </a:rPr>
-              <a:t>Estimated Time</a:t>
-            </a:r>
-            <a:endParaRPr lang="en-US" sz="2500" dirty="0">
-              <a:solidFill>
-                <a:srgbClr val="B6A674"/>
-              </a:solidFill>
-            </a:endParaRPr>
-          </a:p>
-        </p:txBody>
-      </p:sp>
-      <p:sp>
-        <p:nvSpPr>
-          <p:cNvPr id="22" name="TextBox 21"/>
-          <p:cNvSpPr txBox="1"/>
-          <p:nvPr/>
-        </p:nvSpPr>
-        <p:spPr>
-          <a:xfrm>
-            <a:off x="14859000" y="25755600"/>
-            <a:ext cx="3505200" cy="2015936"/>
-          </a:xfrm>
-          <a:prstGeom prst="rect">
-            <a:avLst/>
-          </a:prstGeom>
-          <a:noFill/>
-        </p:spPr>
-        <p:txBody>
-          <a:bodyPr wrap="square" rtlCol="0">
-            <a:spAutoFit/>
-          </a:bodyPr>
-          <a:lstStyle/>
-          <a:p>
-            <a:r>
-              <a:rPr lang="en-US" sz="2500" dirty="0" smtClean="0">
-                <a:solidFill>
-                  <a:srgbClr val="B6A674"/>
-                </a:solidFill>
-              </a:rPr>
-              <a:t>Sublime Text 2 was used to develop the </a:t>
-            </a:r>
-            <a:r>
-              <a:rPr lang="en-US" sz="2500" dirty="0">
-                <a:solidFill>
-                  <a:srgbClr val="B6A674"/>
-                </a:solidFill>
-              </a:rPr>
-              <a:t>S</a:t>
-            </a:r>
-            <a:r>
-              <a:rPr lang="en-US" sz="2500" dirty="0" smtClean="0">
-                <a:solidFill>
-                  <a:srgbClr val="B6A674"/>
-                </a:solidFill>
-              </a:rPr>
-              <a:t>encha application. Here you can see the Map Controller.</a:t>
-            </a:r>
-            <a:endParaRPr lang="en-US" sz="2500" dirty="0">
-              <a:solidFill>
-                <a:srgbClr val="B6A674"/>
-              </a:solidFill>
-            </a:endParaRPr>
-          </a:p>
-        </p:txBody>
-      </p:sp>
-      <p:pic>
-        <p:nvPicPr>
-          <p:cNvPr id="25" name="Picture 24" descr="Screen Shot 2014-12-03 at 8.28.46 PM.png"/>
-          <p:cNvPicPr>
-            <a:picLocks noChangeAspect="1"/>
-          </p:cNvPicPr>
-          <p:nvPr/>
-        </p:nvPicPr>
-        <p:blipFill>
-          <a:blip r:embed="rId17">
-            <a:extLst>
-              <a:ext uri="{28A0092B-C50C-407E-A947-70E740481C1C}">
-                <a14:useLocalDpi xmlns:a14="http://schemas.microsoft.com/office/drawing/2010/main" val="0"/>
-              </a:ext>
-            </a:extLst>
-          </a:blip>
-          <a:stretch>
-            <a:fillRect/>
-          </a:stretch>
-        </p:blipFill>
-        <p:spPr>
-          <a:xfrm>
             <a:off x="12877800" y="19812000"/>
             <a:ext cx="7798279" cy="5486400"/>
           </a:xfrm>
@@ -7531,7 +6922,7 @@
           <p:nvPr/>
         </p:nvPicPr>
         <p:blipFill>
-          <a:blip r:embed="rId18">
+          <a:blip r:embed="rId16">
             <a:extLst>
               <a:ext uri="{28A0092B-C50C-407E-A947-70E740481C1C}">
                 <a14:useLocalDpi xmlns:a14="http://schemas.microsoft.com/office/drawing/2010/main" val="0"/>
@@ -7795,7 +7186,7 @@
         <p:spPr>
           <a:xfrm>
             <a:off x="20345400" y="14173200"/>
-            <a:ext cx="8610600" cy="1938992"/>
+            <a:ext cx="8610600" cy="1631216"/>
           </a:xfrm>
           <a:prstGeom prst="rect">
             <a:avLst/>
@@ -7809,7 +7200,7 @@
           <a:lstStyle/>
           <a:p>
             <a:r>
-              <a:rPr lang="en-US" sz="3000" dirty="0" smtClean="0"/>
+              <a:rPr lang="en-US" sz="2500" dirty="0" smtClean="0"/>
               <a:t>3-Tier Architecture</a:t>
             </a:r>
           </a:p>
@@ -7819,9 +7210,22 @@
               <a:buChar char="•"/>
             </a:pPr>
             <a:r>
-              <a:rPr lang="en-US" sz="3000" dirty="0" smtClean="0"/>
-              <a:t>Presentation Layer – </a:t>
-            </a:r>
+              <a:rPr lang="en-US" sz="2500" dirty="0" smtClean="0"/>
+              <a:t>Presentation Layer </a:t>
+            </a:r>
+            <a:r>
+              <a:rPr lang="en-US" sz="2500" dirty="0" smtClean="0"/>
+              <a:t>– </a:t>
+            </a:r>
+            <a:r>
+              <a:rPr lang="en-US" sz="2500" dirty="0" err="1" smtClean="0"/>
+              <a:t>Sencha</a:t>
+            </a:r>
+            <a:r>
+              <a:rPr lang="en-US" sz="2500" dirty="0" smtClean="0"/>
+              <a:t> Application </a:t>
+            </a:r>
+            <a:endParaRPr lang="en-US" sz="2500" dirty="0" smtClean="0"/>
           </a:p>
           <a:p>
             <a:pPr marL="457200" indent="-457200">
@@ -7829,9 +7233,18 @@
               <a:buChar char="•"/>
             </a:pPr>
             <a:r>
-              <a:rPr lang="en-US" sz="3000" dirty="0" smtClean="0"/>
+              <a:rPr lang="en-US" sz="2500" dirty="0" smtClean="0"/>
               <a:t>Business Layer – </a:t>
             </a:r>
+            <a:r>
+              <a:rPr lang="en-US" sz="2500" dirty="0" smtClean="0"/>
+              <a:t>Spring/Tomca</a:t>
+            </a:r>
+            <a:r>
+              <a:rPr lang="en-US" sz="2500" dirty="0" smtClean="0"/>
+              <a:t>t Server</a:t>
+            </a:r>
+            <a:endParaRPr lang="en-US" sz="2500" dirty="0" smtClean="0"/>
           </a:p>
           <a:p>
             <a:pPr marL="457200" indent="-457200">
@@ -7839,18 +7252,18 @@
               <a:buChar char="•"/>
             </a:pPr>
             <a:r>
-              <a:rPr lang="en-US" sz="3000" dirty="0" smtClean="0"/>
+              <a:rPr lang="en-US" sz="2500" dirty="0" smtClean="0"/>
               <a:t>Data Layer – </a:t>
             </a:r>
             <a:r>
-              <a:rPr lang="en-US" sz="3000" dirty="0" err="1" smtClean="0"/>
-              <a:t>MySql</a:t>
-            </a:r>
-            <a:r>
-              <a:rPr lang="en-US" sz="3000" dirty="0" smtClean="0"/>
-              <a:t> Database</a:t>
-            </a:r>
-            <a:endParaRPr lang="en-US" sz="3000" dirty="0"/>
+              <a:rPr lang="en-US" sz="2500" dirty="0" smtClean="0"/>
+              <a:t>MySQL </a:t>
+            </a:r>
+            <a:r>
+              <a:rPr lang="en-US" sz="2500" dirty="0" smtClean="0"/>
+              <a:t>Database</a:t>
+            </a:r>
+            <a:endParaRPr lang="en-US" sz="2500" dirty="0"/>
           </a:p>
         </p:txBody>
       </p:sp>
@@ -7863,7 +7276,7 @@
         <p:spPr>
           <a:xfrm>
             <a:off x="1981200" y="28422600"/>
-            <a:ext cx="8686800" cy="1015663"/>
+            <a:ext cx="8686800" cy="861774"/>
           </a:xfrm>
           <a:prstGeom prst="rect">
             <a:avLst/>
@@ -7878,10 +7291,673 @@
           <a:p>
             <a:pPr algn="ctr"/>
             <a:r>
-              <a:rPr lang="en-US" sz="3000" dirty="0" smtClean="0"/>
+              <a:rPr lang="en-US" sz="2500" dirty="0" smtClean="0"/>
               <a:t>Above are the classes I implemented for the Estimated Time Functionality</a:t>
             </a:r>
-            <a:endParaRPr lang="en-US" sz="3000" dirty="0"/>
+            <a:endParaRPr lang="en-US" sz="2500" dirty="0"/>
+          </a:p>
+        </p:txBody>
+      </p:sp>
+      <p:graphicFrame>
+        <p:nvGraphicFramePr>
+          <p:cNvPr id="47" name="Object 46"/>
+          <p:cNvGraphicFramePr>
+            <a:graphicFrameLocks noChangeAspect="1"/>
+          </p:cNvGraphicFramePr>
+          <p:nvPr>
+            <p:extLst>
+              <p:ext uri="{D42A27DB-BD31-4B8C-83A1-F6EECF244321}">
+                <p14:modId xmlns:p14="http://schemas.microsoft.com/office/powerpoint/2010/main" val="2456048842"/>
+              </p:ext>
+            </p:extLst>
+          </p:nvPr>
+        </p:nvGraphicFramePr>
+        <p:xfrm>
+          <a:off x="1371600" y="73420"/>
+          <a:ext cx="6985442" cy="2362200"/>
+        </p:xfrm>
+        <a:graphic>
+          <a:graphicData uri="http://schemas.openxmlformats.org/presentationml/2006/ole">
+            <mc:AlternateContent xmlns:mc="http://schemas.openxmlformats.org/markup-compatibility/2006">
+              <mc:Choice xmlns:v="urn:schemas-microsoft-com:vml" Requires="v">
+                <p:oleObj spid="_x0000_s1041" name="Image" r:id="rId17" imgW="4055760" imgH="1371240" progId="Photoshop.Image.15">
+                  <p:embed/>
+                </p:oleObj>
+              </mc:Choice>
+              <mc:Fallback>
+                <p:oleObj name="Image" r:id="rId17" imgW="4055760" imgH="1371240" progId="Photoshop.Image.15">
+                  <p:embed/>
+                  <p:pic>
+                    <p:nvPicPr>
+                      <p:cNvPr id="0" name=""/>
+                      <p:cNvPicPr/>
+                      <p:nvPr/>
+                    </p:nvPicPr>
+                    <p:blipFill>
+                      <a:blip r:embed="rId18"/>
+                      <a:stretch>
+                        <a:fillRect/>
+                      </a:stretch>
+                    </p:blipFill>
+                    <p:spPr>
+                      <a:xfrm>
+                        <a:off x="1371600" y="73420"/>
+                        <a:ext cx="6985442" cy="2362200"/>
+                      </a:xfrm>
+                      <a:prstGeom prst="rect">
+                        <a:avLst/>
+                      </a:prstGeom>
+                    </p:spPr>
+                  </p:pic>
+                </p:oleObj>
+              </mc:Fallback>
+            </mc:AlternateContent>
+          </a:graphicData>
+        </a:graphic>
+      </p:graphicFrame>
+      <p:pic>
+        <p:nvPicPr>
+          <p:cNvPr id="48" name="Picture 47" descr="ShowImage.png"/>
+          <p:cNvPicPr>
+            <a:picLocks noChangeAspect="1"/>
+          </p:cNvPicPr>
+          <p:nvPr/>
+        </p:nvPicPr>
+        <p:blipFill>
+          <a:blip r:embed="rId7">
+            <a:extLst>
+              <a:ext uri="{28A0092B-C50C-407E-A947-70E740481C1C}">
+                <a14:useLocalDpi xmlns:a14="http://schemas.microsoft.com/office/drawing/2010/main" val="0"/>
+              </a:ext>
+            </a:extLst>
+          </a:blip>
+          <a:stretch>
+            <a:fillRect/>
+          </a:stretch>
+        </p:blipFill>
+        <p:spPr>
+          <a:xfrm>
+            <a:off x="5943600" y="-2780"/>
+            <a:ext cx="2511112" cy="2486000"/>
+          </a:xfrm>
+          <a:prstGeom prst="rect">
+            <a:avLst/>
+          </a:prstGeom>
+        </p:spPr>
+      </p:pic>
+      <p:pic>
+        <p:nvPicPr>
+          <p:cNvPr id="10" name="Picture 9" descr="sencha-touch-logo-tizen-experts.png"/>
+          <p:cNvPicPr>
+            <a:picLocks noChangeAspect="1"/>
+          </p:cNvPicPr>
+          <p:nvPr/>
+        </p:nvPicPr>
+        <p:blipFill>
+          <a:blip r:embed="rId19">
+            <a:extLst>
+              <a:ext uri="{28A0092B-C50C-407E-A947-70E740481C1C}">
+                <a14:useLocalDpi xmlns:a14="http://schemas.microsoft.com/office/drawing/2010/main" val="0"/>
+              </a:ext>
+            </a:extLst>
+          </a:blip>
+          <a:stretch>
+            <a:fillRect/>
+          </a:stretch>
+        </p:blipFill>
+        <p:spPr>
+          <a:xfrm>
+            <a:off x="685800" y="2286000"/>
+            <a:ext cx="5080000" cy="2120900"/>
+          </a:xfrm>
+          <a:prstGeom prst="rect">
+            <a:avLst/>
+          </a:prstGeom>
+        </p:spPr>
+      </p:pic>
+      <p:pic>
+        <p:nvPicPr>
+          <p:cNvPr id="4" name="Picture 3" descr="Javascript_logo_unofficial-300x300.png"/>
+          <p:cNvPicPr>
+            <a:picLocks noChangeAspect="1"/>
+          </p:cNvPicPr>
+          <p:nvPr/>
+        </p:nvPicPr>
+        <p:blipFill>
+          <a:blip r:embed="rId20">
+            <a:extLst>
+              <a:ext uri="{28A0092B-C50C-407E-A947-70E740481C1C}">
+                <a14:useLocalDpi xmlns:a14="http://schemas.microsoft.com/office/drawing/2010/main" val="0"/>
+              </a:ext>
+            </a:extLst>
+          </a:blip>
+          <a:stretch>
+            <a:fillRect/>
+          </a:stretch>
+        </p:blipFill>
+        <p:spPr>
+          <a:xfrm>
+            <a:off x="6324600" y="2438400"/>
+            <a:ext cx="2895600" cy="2895600"/>
+          </a:xfrm>
+          <a:prstGeom prst="rect">
+            <a:avLst/>
+          </a:prstGeom>
+        </p:spPr>
+      </p:pic>
+      <p:sp>
+        <p:nvSpPr>
+          <p:cNvPr id="215" name="Text Box 19"/>
+          <p:cNvSpPr txBox="1">
+            <a:spLocks noChangeArrowheads="1"/>
+          </p:cNvSpPr>
+          <p:nvPr/>
+        </p:nvSpPr>
+        <p:spPr bwMode="auto">
+          <a:xfrm>
+            <a:off x="4114800" y="6553200"/>
+            <a:ext cx="5486400" cy="731837"/>
+          </a:xfrm>
+          <a:prstGeom prst="rect">
+            <a:avLst/>
+          </a:prstGeom>
+          <a:solidFill>
+            <a:srgbClr val="B6A674"/>
+          </a:solidFill>
+          <a:ln>
+            <a:headEnd/>
+            <a:tailEnd/>
+          </a:ln>
+        </p:spPr>
+        <p:style>
+          <a:lnRef idx="1">
+            <a:schemeClr val="dk1"/>
+          </a:lnRef>
+          <a:fillRef idx="2">
+            <a:schemeClr val="dk1"/>
+          </a:fillRef>
+          <a:effectRef idx="1">
+            <a:schemeClr val="dk1"/>
+          </a:effectRef>
+          <a:fontRef idx="minor">
+            <a:schemeClr val="dk1"/>
+          </a:fontRef>
+        </p:style>
+        <p:txBody>
+          <a:bodyPr lIns="98655" tIns="49327" rIns="98655" bIns="49327">
+            <a:spAutoFit/>
+          </a:bodyPr>
+          <a:lstStyle>
+            <a:lvl1pPr defTabSz="985838" eaLnBrk="0" hangingPunct="0">
+              <a:defRPr sz="8400">
+                <a:solidFill>
+                  <a:schemeClr val="tx1"/>
+                </a:solidFill>
+                <a:latin typeface="Arial" charset="0"/>
+                <a:ea typeface="ＭＳ Ｐゴシック" charset="0"/>
+                <a:cs typeface="ＭＳ Ｐゴシック" charset="0"/>
+              </a:defRPr>
+            </a:lvl1pPr>
+            <a:lvl2pPr marL="37931725" indent="-37474525" defTabSz="985838" eaLnBrk="0" hangingPunct="0">
+              <a:defRPr sz="8400">
+                <a:solidFill>
+                  <a:schemeClr val="tx1"/>
+                </a:solidFill>
+                <a:latin typeface="Arial" charset="0"/>
+                <a:ea typeface="ＭＳ Ｐゴシック" charset="0"/>
+              </a:defRPr>
+            </a:lvl2pPr>
+            <a:lvl3pPr eaLnBrk="0" hangingPunct="0">
+              <a:defRPr sz="8400">
+                <a:solidFill>
+                  <a:schemeClr val="tx1"/>
+                </a:solidFill>
+                <a:latin typeface="Arial" charset="0"/>
+                <a:ea typeface="ＭＳ Ｐゴシック" charset="0"/>
+              </a:defRPr>
+            </a:lvl3pPr>
+            <a:lvl4pPr eaLnBrk="0" hangingPunct="0">
+              <a:defRPr sz="8400">
+                <a:solidFill>
+                  <a:schemeClr val="tx1"/>
+                </a:solidFill>
+                <a:latin typeface="Arial" charset="0"/>
+                <a:ea typeface="ＭＳ Ｐゴシック" charset="0"/>
+              </a:defRPr>
+            </a:lvl4pPr>
+            <a:lvl5pPr eaLnBrk="0" hangingPunct="0">
+              <a:defRPr sz="8400">
+                <a:solidFill>
+                  <a:schemeClr val="tx1"/>
+                </a:solidFill>
+                <a:latin typeface="Arial" charset="0"/>
+                <a:ea typeface="ＭＳ Ｐゴシック" charset="0"/>
+              </a:defRPr>
+            </a:lvl5pPr>
+            <a:lvl6pPr marL="457200" eaLnBrk="0" fontAlgn="base" hangingPunct="0">
+              <a:spcBef>
+                <a:spcPct val="0"/>
+              </a:spcBef>
+              <a:spcAft>
+                <a:spcPct val="0"/>
+              </a:spcAft>
+              <a:defRPr sz="8400">
+                <a:solidFill>
+                  <a:schemeClr val="tx1"/>
+                </a:solidFill>
+                <a:latin typeface="Arial" charset="0"/>
+                <a:ea typeface="ＭＳ Ｐゴシック" charset="0"/>
+              </a:defRPr>
+            </a:lvl6pPr>
+            <a:lvl7pPr marL="914400" eaLnBrk="0" fontAlgn="base" hangingPunct="0">
+              <a:spcBef>
+                <a:spcPct val="0"/>
+              </a:spcBef>
+              <a:spcAft>
+                <a:spcPct val="0"/>
+              </a:spcAft>
+              <a:defRPr sz="8400">
+                <a:solidFill>
+                  <a:schemeClr val="tx1"/>
+                </a:solidFill>
+                <a:latin typeface="Arial" charset="0"/>
+                <a:ea typeface="ＭＳ Ｐゴシック" charset="0"/>
+              </a:defRPr>
+            </a:lvl7pPr>
+            <a:lvl8pPr marL="1371600" eaLnBrk="0" fontAlgn="base" hangingPunct="0">
+              <a:spcBef>
+                <a:spcPct val="0"/>
+              </a:spcBef>
+              <a:spcAft>
+                <a:spcPct val="0"/>
+              </a:spcAft>
+              <a:defRPr sz="8400">
+                <a:solidFill>
+                  <a:schemeClr val="tx1"/>
+                </a:solidFill>
+                <a:latin typeface="Arial" charset="0"/>
+                <a:ea typeface="ＭＳ Ｐゴシック" charset="0"/>
+              </a:defRPr>
+            </a:lvl8pPr>
+            <a:lvl9pPr marL="1828800" eaLnBrk="0" fontAlgn="base" hangingPunct="0">
+              <a:spcBef>
+                <a:spcPct val="0"/>
+              </a:spcBef>
+              <a:spcAft>
+                <a:spcPct val="0"/>
+              </a:spcAft>
+              <a:defRPr sz="8400">
+                <a:solidFill>
+                  <a:schemeClr val="tx1"/>
+                </a:solidFill>
+                <a:latin typeface="Arial" charset="0"/>
+                <a:ea typeface="ＭＳ Ｐゴシック" charset="0"/>
+              </a:defRPr>
+            </a:lvl9pPr>
+          </a:lstStyle>
+          <a:p>
+            <a:pPr algn="ctr" eaLnBrk="1" hangingPunct="1">
+              <a:spcBef>
+                <a:spcPct val="50000"/>
+              </a:spcBef>
+            </a:pPr>
+            <a:r>
+              <a:rPr lang="en-US" sz="4100" b="1" dirty="0">
+                <a:solidFill>
+                  <a:srgbClr val="1B390A"/>
+                </a:solidFill>
+                <a:effectLst>
+                  <a:outerShdw blurRad="38100" dist="38100" dir="2700000" algn="tl">
+                    <a:srgbClr val="DDDDDD"/>
+                  </a:outerShdw>
+                </a:effectLst>
+              </a:rPr>
+              <a:t>Problem</a:t>
+            </a:r>
+          </a:p>
+        </p:txBody>
+      </p:sp>
+      <p:sp>
+        <p:nvSpPr>
+          <p:cNvPr id="34" name="Text Box 19"/>
+          <p:cNvSpPr txBox="1">
+            <a:spLocks noChangeArrowheads="1"/>
+          </p:cNvSpPr>
+          <p:nvPr/>
+        </p:nvSpPr>
+        <p:spPr bwMode="auto">
+          <a:xfrm>
+            <a:off x="13639800" y="6553200"/>
+            <a:ext cx="5486400" cy="731837"/>
+          </a:xfrm>
+          <a:prstGeom prst="rect">
+            <a:avLst/>
+          </a:prstGeom>
+          <a:solidFill>
+            <a:srgbClr val="B6A674"/>
+          </a:solidFill>
+          <a:ln>
+            <a:headEnd/>
+            <a:tailEnd/>
+          </a:ln>
+        </p:spPr>
+        <p:style>
+          <a:lnRef idx="1">
+            <a:schemeClr val="dk1"/>
+          </a:lnRef>
+          <a:fillRef idx="2">
+            <a:schemeClr val="dk1"/>
+          </a:fillRef>
+          <a:effectRef idx="1">
+            <a:schemeClr val="dk1"/>
+          </a:effectRef>
+          <a:fontRef idx="minor">
+            <a:schemeClr val="dk1"/>
+          </a:fontRef>
+        </p:style>
+        <p:txBody>
+          <a:bodyPr lIns="98655" tIns="49327" rIns="98655" bIns="49327">
+            <a:spAutoFit/>
+          </a:bodyPr>
+          <a:lstStyle>
+            <a:lvl1pPr defTabSz="985838" eaLnBrk="0" hangingPunct="0">
+              <a:defRPr sz="8400">
+                <a:solidFill>
+                  <a:schemeClr val="tx1"/>
+                </a:solidFill>
+                <a:latin typeface="Arial" charset="0"/>
+                <a:ea typeface="ＭＳ Ｐゴシック" charset="0"/>
+                <a:cs typeface="ＭＳ Ｐゴシック" charset="0"/>
+              </a:defRPr>
+            </a:lvl1pPr>
+            <a:lvl2pPr marL="37931725" indent="-37474525" defTabSz="985838" eaLnBrk="0" hangingPunct="0">
+              <a:defRPr sz="8400">
+                <a:solidFill>
+                  <a:schemeClr val="tx1"/>
+                </a:solidFill>
+                <a:latin typeface="Arial" charset="0"/>
+                <a:ea typeface="ＭＳ Ｐゴシック" charset="0"/>
+              </a:defRPr>
+            </a:lvl2pPr>
+            <a:lvl3pPr eaLnBrk="0" hangingPunct="0">
+              <a:defRPr sz="8400">
+                <a:solidFill>
+                  <a:schemeClr val="tx1"/>
+                </a:solidFill>
+                <a:latin typeface="Arial" charset="0"/>
+                <a:ea typeface="ＭＳ Ｐゴシック" charset="0"/>
+              </a:defRPr>
+            </a:lvl3pPr>
+            <a:lvl4pPr eaLnBrk="0" hangingPunct="0">
+              <a:defRPr sz="8400">
+                <a:solidFill>
+                  <a:schemeClr val="tx1"/>
+                </a:solidFill>
+                <a:latin typeface="Arial" charset="0"/>
+                <a:ea typeface="ＭＳ Ｐゴシック" charset="0"/>
+              </a:defRPr>
+            </a:lvl4pPr>
+            <a:lvl5pPr eaLnBrk="0" hangingPunct="0">
+              <a:defRPr sz="8400">
+                <a:solidFill>
+                  <a:schemeClr val="tx1"/>
+                </a:solidFill>
+                <a:latin typeface="Arial" charset="0"/>
+                <a:ea typeface="ＭＳ Ｐゴシック" charset="0"/>
+              </a:defRPr>
+            </a:lvl5pPr>
+            <a:lvl6pPr marL="457200" eaLnBrk="0" fontAlgn="base" hangingPunct="0">
+              <a:spcBef>
+                <a:spcPct val="0"/>
+              </a:spcBef>
+              <a:spcAft>
+                <a:spcPct val="0"/>
+              </a:spcAft>
+              <a:defRPr sz="8400">
+                <a:solidFill>
+                  <a:schemeClr val="tx1"/>
+                </a:solidFill>
+                <a:latin typeface="Arial" charset="0"/>
+                <a:ea typeface="ＭＳ Ｐゴシック" charset="0"/>
+              </a:defRPr>
+            </a:lvl6pPr>
+            <a:lvl7pPr marL="914400" eaLnBrk="0" fontAlgn="base" hangingPunct="0">
+              <a:spcBef>
+                <a:spcPct val="0"/>
+              </a:spcBef>
+              <a:spcAft>
+                <a:spcPct val="0"/>
+              </a:spcAft>
+              <a:defRPr sz="8400">
+                <a:solidFill>
+                  <a:schemeClr val="tx1"/>
+                </a:solidFill>
+                <a:latin typeface="Arial" charset="0"/>
+                <a:ea typeface="ＭＳ Ｐゴシック" charset="0"/>
+              </a:defRPr>
+            </a:lvl7pPr>
+            <a:lvl8pPr marL="1371600" eaLnBrk="0" fontAlgn="base" hangingPunct="0">
+              <a:spcBef>
+                <a:spcPct val="0"/>
+              </a:spcBef>
+              <a:spcAft>
+                <a:spcPct val="0"/>
+              </a:spcAft>
+              <a:defRPr sz="8400">
+                <a:solidFill>
+                  <a:schemeClr val="tx1"/>
+                </a:solidFill>
+                <a:latin typeface="Arial" charset="0"/>
+                <a:ea typeface="ＭＳ Ｐゴシック" charset="0"/>
+              </a:defRPr>
+            </a:lvl8pPr>
+            <a:lvl9pPr marL="1828800" eaLnBrk="0" fontAlgn="base" hangingPunct="0">
+              <a:spcBef>
+                <a:spcPct val="0"/>
+              </a:spcBef>
+              <a:spcAft>
+                <a:spcPct val="0"/>
+              </a:spcAft>
+              <a:defRPr sz="8400">
+                <a:solidFill>
+                  <a:schemeClr val="tx1"/>
+                </a:solidFill>
+                <a:latin typeface="Arial" charset="0"/>
+                <a:ea typeface="ＭＳ Ｐゴシック" charset="0"/>
+              </a:defRPr>
+            </a:lvl9pPr>
+          </a:lstStyle>
+          <a:p>
+            <a:pPr algn="ctr" eaLnBrk="1" hangingPunct="1">
+              <a:spcBef>
+                <a:spcPct val="50000"/>
+              </a:spcBef>
+            </a:pPr>
+            <a:r>
+              <a:rPr lang="en-US" sz="4100" b="1" dirty="0">
+                <a:solidFill>
+                  <a:srgbClr val="1B390A"/>
+                </a:solidFill>
+                <a:effectLst>
+                  <a:outerShdw blurRad="38100" dist="38100" dir="2700000" algn="tl">
+                    <a:srgbClr val="DDDDDD"/>
+                  </a:outerShdw>
+                </a:effectLst>
+              </a:rPr>
+              <a:t>Current System</a:t>
+            </a:r>
+          </a:p>
+        </p:txBody>
+      </p:sp>
+      <p:sp>
+        <p:nvSpPr>
+          <p:cNvPr id="35" name="Text Box 19"/>
+          <p:cNvSpPr txBox="1">
+            <a:spLocks noChangeArrowheads="1"/>
+          </p:cNvSpPr>
+          <p:nvPr/>
+        </p:nvSpPr>
+        <p:spPr bwMode="auto">
+          <a:xfrm>
+            <a:off x="23850600" y="6507163"/>
+            <a:ext cx="5486400" cy="731837"/>
+          </a:xfrm>
+          <a:prstGeom prst="rect">
+            <a:avLst/>
+          </a:prstGeom>
+          <a:solidFill>
+            <a:srgbClr val="B6A674"/>
+          </a:solidFill>
+          <a:ln>
+            <a:headEnd/>
+            <a:tailEnd/>
+          </a:ln>
+        </p:spPr>
+        <p:style>
+          <a:lnRef idx="1">
+            <a:schemeClr val="dk1"/>
+          </a:lnRef>
+          <a:fillRef idx="2">
+            <a:schemeClr val="dk1"/>
+          </a:fillRef>
+          <a:effectRef idx="1">
+            <a:schemeClr val="dk1"/>
+          </a:effectRef>
+          <a:fontRef idx="minor">
+            <a:schemeClr val="dk1"/>
+          </a:fontRef>
+        </p:style>
+        <p:txBody>
+          <a:bodyPr lIns="98655" tIns="49327" rIns="98655" bIns="49327">
+            <a:spAutoFit/>
+          </a:bodyPr>
+          <a:lstStyle>
+            <a:lvl1pPr defTabSz="985838" eaLnBrk="0" hangingPunct="0">
+              <a:defRPr sz="8400">
+                <a:solidFill>
+                  <a:schemeClr val="tx1"/>
+                </a:solidFill>
+                <a:latin typeface="Arial" charset="0"/>
+                <a:ea typeface="ＭＳ Ｐゴシック" charset="0"/>
+                <a:cs typeface="ＭＳ Ｐゴシック" charset="0"/>
+              </a:defRPr>
+            </a:lvl1pPr>
+            <a:lvl2pPr marL="37931725" indent="-37474525" defTabSz="985838" eaLnBrk="0" hangingPunct="0">
+              <a:defRPr sz="8400">
+                <a:solidFill>
+                  <a:schemeClr val="tx1"/>
+                </a:solidFill>
+                <a:latin typeface="Arial" charset="0"/>
+                <a:ea typeface="ＭＳ Ｐゴシック" charset="0"/>
+              </a:defRPr>
+            </a:lvl2pPr>
+            <a:lvl3pPr eaLnBrk="0" hangingPunct="0">
+              <a:defRPr sz="8400">
+                <a:solidFill>
+                  <a:schemeClr val="tx1"/>
+                </a:solidFill>
+                <a:latin typeface="Arial" charset="0"/>
+                <a:ea typeface="ＭＳ Ｐゴシック" charset="0"/>
+              </a:defRPr>
+            </a:lvl3pPr>
+            <a:lvl4pPr eaLnBrk="0" hangingPunct="0">
+              <a:defRPr sz="8400">
+                <a:solidFill>
+                  <a:schemeClr val="tx1"/>
+                </a:solidFill>
+                <a:latin typeface="Arial" charset="0"/>
+                <a:ea typeface="ＭＳ Ｐゴシック" charset="0"/>
+              </a:defRPr>
+            </a:lvl4pPr>
+            <a:lvl5pPr eaLnBrk="0" hangingPunct="0">
+              <a:defRPr sz="8400">
+                <a:solidFill>
+                  <a:schemeClr val="tx1"/>
+                </a:solidFill>
+                <a:latin typeface="Arial" charset="0"/>
+                <a:ea typeface="ＭＳ Ｐゴシック" charset="0"/>
+              </a:defRPr>
+            </a:lvl5pPr>
+            <a:lvl6pPr marL="457200" eaLnBrk="0" fontAlgn="base" hangingPunct="0">
+              <a:spcBef>
+                <a:spcPct val="0"/>
+              </a:spcBef>
+              <a:spcAft>
+                <a:spcPct val="0"/>
+              </a:spcAft>
+              <a:defRPr sz="8400">
+                <a:solidFill>
+                  <a:schemeClr val="tx1"/>
+                </a:solidFill>
+                <a:latin typeface="Arial" charset="0"/>
+                <a:ea typeface="ＭＳ Ｐゴシック" charset="0"/>
+              </a:defRPr>
+            </a:lvl6pPr>
+            <a:lvl7pPr marL="914400" eaLnBrk="0" fontAlgn="base" hangingPunct="0">
+              <a:spcBef>
+                <a:spcPct val="0"/>
+              </a:spcBef>
+              <a:spcAft>
+                <a:spcPct val="0"/>
+              </a:spcAft>
+              <a:defRPr sz="8400">
+                <a:solidFill>
+                  <a:schemeClr val="tx1"/>
+                </a:solidFill>
+                <a:latin typeface="Arial" charset="0"/>
+                <a:ea typeface="ＭＳ Ｐゴシック" charset="0"/>
+              </a:defRPr>
+            </a:lvl7pPr>
+            <a:lvl8pPr marL="1371600" eaLnBrk="0" fontAlgn="base" hangingPunct="0">
+              <a:spcBef>
+                <a:spcPct val="0"/>
+              </a:spcBef>
+              <a:spcAft>
+                <a:spcPct val="0"/>
+              </a:spcAft>
+              <a:defRPr sz="8400">
+                <a:solidFill>
+                  <a:schemeClr val="tx1"/>
+                </a:solidFill>
+                <a:latin typeface="Arial" charset="0"/>
+                <a:ea typeface="ＭＳ Ｐゴシック" charset="0"/>
+              </a:defRPr>
+            </a:lvl8pPr>
+            <a:lvl9pPr marL="1828800" eaLnBrk="0" fontAlgn="base" hangingPunct="0">
+              <a:spcBef>
+                <a:spcPct val="0"/>
+              </a:spcBef>
+              <a:spcAft>
+                <a:spcPct val="0"/>
+              </a:spcAft>
+              <a:defRPr sz="8400">
+                <a:solidFill>
+                  <a:schemeClr val="tx1"/>
+                </a:solidFill>
+                <a:latin typeface="Arial" charset="0"/>
+                <a:ea typeface="ＭＳ Ｐゴシック" charset="0"/>
+              </a:defRPr>
+            </a:lvl9pPr>
+          </a:lstStyle>
+          <a:p>
+            <a:pPr algn="ctr" eaLnBrk="1" hangingPunct="1">
+              <a:spcBef>
+                <a:spcPct val="50000"/>
+              </a:spcBef>
+            </a:pPr>
+            <a:r>
+              <a:rPr lang="en-US" sz="4100" b="1" dirty="0">
+                <a:solidFill>
+                  <a:srgbClr val="1B390A"/>
+                </a:solidFill>
+                <a:effectLst>
+                  <a:outerShdw blurRad="38100" dist="38100" dir="2700000" algn="tl">
+                    <a:srgbClr val="DDDDDD"/>
+                  </a:outerShdw>
+                </a:effectLst>
+              </a:rPr>
+              <a:t>Requirements</a:t>
+            </a:r>
           </a:p>
         </p:txBody>
       </p:sp>

</xml_diff>